<commit_message>
Added some images to break block of texts
</commit_message>
<xml_diff>
--- a/src/figures/figs.pptx
+++ b/src/figures/figs.pptx
@@ -9,6 +9,8 @@
     <p:sldId id="257" r:id="rId3"/>
     <p:sldId id="258" r:id="rId4"/>
     <p:sldId id="259" r:id="rId5"/>
+    <p:sldId id="260" r:id="rId6"/>
+    <p:sldId id="261" r:id="rId7"/>
   </p:sldIdLst>
   <p:sldSz cx="12192000" cy="6858000"/>
   <p:notesSz cx="6858000" cy="9144000"/>
@@ -262,7 +264,7 @@
           <a:p>
             <a:fld id="{7B7F996B-F12A-4210-B7C6-42A7EEA9A16E}" type="datetimeFigureOut">
               <a:rPr lang="hu-HU" smtClean="0"/>
-              <a:t>2018. 12. 02.</a:t>
+              <a:t>2018. 12. 05.</a:t>
             </a:fld>
             <a:endParaRPr lang="hu-HU"/>
           </a:p>
@@ -460,7 +462,7 @@
           <a:p>
             <a:fld id="{7B7F996B-F12A-4210-B7C6-42A7EEA9A16E}" type="datetimeFigureOut">
               <a:rPr lang="hu-HU" smtClean="0"/>
-              <a:t>2018. 12. 02.</a:t>
+              <a:t>2018. 12. 05.</a:t>
             </a:fld>
             <a:endParaRPr lang="hu-HU"/>
           </a:p>
@@ -668,7 +670,7 @@
           <a:p>
             <a:fld id="{7B7F996B-F12A-4210-B7C6-42A7EEA9A16E}" type="datetimeFigureOut">
               <a:rPr lang="hu-HU" smtClean="0"/>
-              <a:t>2018. 12. 02.</a:t>
+              <a:t>2018. 12. 05.</a:t>
             </a:fld>
             <a:endParaRPr lang="hu-HU"/>
           </a:p>
@@ -866,7 +868,7 @@
           <a:p>
             <a:fld id="{7B7F996B-F12A-4210-B7C6-42A7EEA9A16E}" type="datetimeFigureOut">
               <a:rPr lang="hu-HU" smtClean="0"/>
-              <a:t>2018. 12. 02.</a:t>
+              <a:t>2018. 12. 05.</a:t>
             </a:fld>
             <a:endParaRPr lang="hu-HU"/>
           </a:p>
@@ -1141,7 +1143,7 @@
           <a:p>
             <a:fld id="{7B7F996B-F12A-4210-B7C6-42A7EEA9A16E}" type="datetimeFigureOut">
               <a:rPr lang="hu-HU" smtClean="0"/>
-              <a:t>2018. 12. 02.</a:t>
+              <a:t>2018. 12. 05.</a:t>
             </a:fld>
             <a:endParaRPr lang="hu-HU"/>
           </a:p>
@@ -1406,7 +1408,7 @@
           <a:p>
             <a:fld id="{7B7F996B-F12A-4210-B7C6-42A7EEA9A16E}" type="datetimeFigureOut">
               <a:rPr lang="hu-HU" smtClean="0"/>
-              <a:t>2018. 12. 02.</a:t>
+              <a:t>2018. 12. 05.</a:t>
             </a:fld>
             <a:endParaRPr lang="hu-HU"/>
           </a:p>
@@ -1818,7 +1820,7 @@
           <a:p>
             <a:fld id="{7B7F996B-F12A-4210-B7C6-42A7EEA9A16E}" type="datetimeFigureOut">
               <a:rPr lang="hu-HU" smtClean="0"/>
-              <a:t>2018. 12. 02.</a:t>
+              <a:t>2018. 12. 05.</a:t>
             </a:fld>
             <a:endParaRPr lang="hu-HU"/>
           </a:p>
@@ -1959,7 +1961,7 @@
           <a:p>
             <a:fld id="{7B7F996B-F12A-4210-B7C6-42A7EEA9A16E}" type="datetimeFigureOut">
               <a:rPr lang="hu-HU" smtClean="0"/>
-              <a:t>2018. 12. 02.</a:t>
+              <a:t>2018. 12. 05.</a:t>
             </a:fld>
             <a:endParaRPr lang="hu-HU"/>
           </a:p>
@@ -2072,7 +2074,7 @@
           <a:p>
             <a:fld id="{7B7F996B-F12A-4210-B7C6-42A7EEA9A16E}" type="datetimeFigureOut">
               <a:rPr lang="hu-HU" smtClean="0"/>
-              <a:t>2018. 12. 02.</a:t>
+              <a:t>2018. 12. 05.</a:t>
             </a:fld>
             <a:endParaRPr lang="hu-HU"/>
           </a:p>
@@ -2383,7 +2385,7 @@
           <a:p>
             <a:fld id="{7B7F996B-F12A-4210-B7C6-42A7EEA9A16E}" type="datetimeFigureOut">
               <a:rPr lang="hu-HU" smtClean="0"/>
-              <a:t>2018. 12. 02.</a:t>
+              <a:t>2018. 12. 05.</a:t>
             </a:fld>
             <a:endParaRPr lang="hu-HU"/>
           </a:p>
@@ -2671,7 +2673,7 @@
           <a:p>
             <a:fld id="{7B7F996B-F12A-4210-B7C6-42A7EEA9A16E}" type="datetimeFigureOut">
               <a:rPr lang="hu-HU" smtClean="0"/>
-              <a:t>2018. 12. 02.</a:t>
+              <a:t>2018. 12. 05.</a:t>
             </a:fld>
             <a:endParaRPr lang="hu-HU"/>
           </a:p>
@@ -2912,7 +2914,7 @@
           <a:p>
             <a:fld id="{7B7F996B-F12A-4210-B7C6-42A7EEA9A16E}" type="datetimeFigureOut">
               <a:rPr lang="hu-HU" smtClean="0"/>
-              <a:t>2018. 12. 02.</a:t>
+              <a:t>2018. 12. 05.</a:t>
             </a:fld>
             <a:endParaRPr lang="hu-HU"/>
           </a:p>
@@ -6224,6 +6226,2961 @@
 </p:sld>
 </file>
 
+<file path=ppt/slides/slide5.xml><?xml version="1.0" encoding="utf-8"?>
+<p:sld xmlns:a="http://schemas.openxmlformats.org/drawingml/2006/main" xmlns:r="http://schemas.openxmlformats.org/officeDocument/2006/relationships" xmlns:p="http://schemas.openxmlformats.org/presentationml/2006/main">
+  <p:cSld>
+    <p:spTree>
+      <p:nvGrpSpPr>
+        <p:cNvPr id="1" name=""/>
+        <p:cNvGrpSpPr/>
+        <p:nvPr/>
+      </p:nvGrpSpPr>
+      <p:grpSpPr>
+        <a:xfrm>
+          <a:off x="0" y="0"/>
+          <a:ext cx="0" cy="0"/>
+          <a:chOff x="0" y="0"/>
+          <a:chExt cx="0" cy="0"/>
+        </a:xfrm>
+      </p:grpSpPr>
+      <p:pic>
+        <p:nvPicPr>
+          <p:cNvPr id="4" name="Kép 3">
+            <a:extLst>
+              <a:ext uri="{FF2B5EF4-FFF2-40B4-BE49-F238E27FC236}">
+                <a16:creationId xmlns:a16="http://schemas.microsoft.com/office/drawing/2014/main" id="{B72994EB-4E7F-454F-8D39-1C9B24CC8B24}"/>
+              </a:ext>
+            </a:extLst>
+          </p:cNvPr>
+          <p:cNvPicPr>
+            <a:picLocks noChangeAspect="1"/>
+          </p:cNvPicPr>
+          <p:nvPr/>
+        </p:nvPicPr>
+        <p:blipFill rotWithShape="1">
+          <a:blip r:embed="rId2"/>
+          <a:srcRect t="4463"/>
+          <a:stretch/>
+        </p:blipFill>
+        <p:spPr>
+          <a:xfrm>
+            <a:off x="1357312" y="466531"/>
+            <a:ext cx="9477375" cy="6215256"/>
+          </a:xfrm>
+          <a:prstGeom prst="rect">
+            <a:avLst/>
+          </a:prstGeom>
+          <a:ln w="3175">
+            <a:solidFill>
+              <a:schemeClr val="tx1"/>
+            </a:solidFill>
+          </a:ln>
+        </p:spPr>
+      </p:pic>
+    </p:spTree>
+    <p:extLst>
+      <p:ext uri="{BB962C8B-B14F-4D97-AF65-F5344CB8AC3E}">
+        <p14:creationId xmlns:p14="http://schemas.microsoft.com/office/powerpoint/2010/main" val="1746635631"/>
+      </p:ext>
+    </p:extLst>
+  </p:cSld>
+  <p:clrMapOvr>
+    <a:masterClrMapping/>
+  </p:clrMapOvr>
+</p:sld>
+</file>
+
+<file path=ppt/slides/slide6.xml><?xml version="1.0" encoding="utf-8"?>
+<p:sld xmlns:a="http://schemas.openxmlformats.org/drawingml/2006/main" xmlns:r="http://schemas.openxmlformats.org/officeDocument/2006/relationships" xmlns:p="http://schemas.openxmlformats.org/presentationml/2006/main">
+  <p:cSld>
+    <p:spTree>
+      <p:nvGrpSpPr>
+        <p:cNvPr id="1" name=""/>
+        <p:cNvGrpSpPr/>
+        <p:nvPr/>
+      </p:nvGrpSpPr>
+      <p:grpSpPr>
+        <a:xfrm>
+          <a:off x="0" y="0"/>
+          <a:ext cx="0" cy="0"/>
+          <a:chOff x="0" y="0"/>
+          <a:chExt cx="0" cy="0"/>
+        </a:xfrm>
+      </p:grpSpPr>
+      <p:sp>
+        <p:nvSpPr>
+          <p:cNvPr id="89" name="Téglalap: lekerekített 88">
+            <a:extLst>
+              <a:ext uri="{FF2B5EF4-FFF2-40B4-BE49-F238E27FC236}">
+                <a16:creationId xmlns:a16="http://schemas.microsoft.com/office/drawing/2014/main" id="{B4AA2375-F131-4C22-AD9E-286DB0AC6A46}"/>
+              </a:ext>
+            </a:extLst>
+          </p:cNvPr>
+          <p:cNvSpPr/>
+          <p:nvPr/>
+        </p:nvSpPr>
+        <p:spPr>
+          <a:xfrm>
+            <a:off x="2326461" y="5448971"/>
+            <a:ext cx="1347843" cy="623772"/>
+          </a:xfrm>
+          <a:prstGeom prst="roundRect">
+            <a:avLst/>
+          </a:prstGeom>
+        </p:spPr>
+        <p:style>
+          <a:lnRef idx="2">
+            <a:schemeClr val="accent1">
+              <a:shade val="50000"/>
+            </a:schemeClr>
+          </a:lnRef>
+          <a:fillRef idx="1">
+            <a:schemeClr val="accent1"/>
+          </a:fillRef>
+          <a:effectRef idx="0">
+            <a:schemeClr val="accent1"/>
+          </a:effectRef>
+          <a:fontRef idx="minor">
+            <a:schemeClr val="lt1"/>
+          </a:fontRef>
+        </p:style>
+        <p:txBody>
+          <a:bodyPr rtlCol="0" anchor="ctr"/>
+          <a:lstStyle/>
+          <a:p>
+            <a:pPr algn="ctr"/>
+            <a:r>
+              <a:rPr lang="hu-HU" dirty="0"/>
+              <a:t>Inactive</a:t>
+            </a:r>
+          </a:p>
+        </p:txBody>
+      </p:sp>
+      <p:sp>
+        <p:nvSpPr>
+          <p:cNvPr id="53" name="Szövegdoboz 52">
+            <a:extLst>
+              <a:ext uri="{FF2B5EF4-FFF2-40B4-BE49-F238E27FC236}">
+                <a16:creationId xmlns:a16="http://schemas.microsoft.com/office/drawing/2014/main" id="{7A80C70D-1228-44D2-8D2D-845BD4F48A4B}"/>
+              </a:ext>
+            </a:extLst>
+          </p:cNvPr>
+          <p:cNvSpPr txBox="1"/>
+          <p:nvPr/>
+        </p:nvSpPr>
+        <p:spPr>
+          <a:xfrm>
+            <a:off x="3913374" y="78560"/>
+            <a:ext cx="990600" cy="369332"/>
+          </a:xfrm>
+          <a:prstGeom prst="rect">
+            <a:avLst/>
+          </a:prstGeom>
+          <a:noFill/>
+        </p:spPr>
+        <p:txBody>
+          <a:bodyPr wrap="square" rtlCol="0">
+            <a:spAutoFit/>
+          </a:bodyPr>
+          <a:lstStyle/>
+          <a:p>
+            <a:r>
+              <a:rPr lang="hu-HU" dirty="0">
+                <a:solidFill>
+                  <a:schemeClr val="bg1"/>
+                </a:solidFill>
+              </a:rPr>
+              <a:t>Active</a:t>
+            </a:r>
+          </a:p>
+        </p:txBody>
+      </p:sp>
+      <p:sp>
+        <p:nvSpPr>
+          <p:cNvPr id="90" name="Nyíl: jobbra mutató 89">
+            <a:extLst>
+              <a:ext uri="{FF2B5EF4-FFF2-40B4-BE49-F238E27FC236}">
+                <a16:creationId xmlns:a16="http://schemas.microsoft.com/office/drawing/2014/main" id="{15B4C8C2-4340-4BE1-B47E-7EA3B6B20745}"/>
+              </a:ext>
+            </a:extLst>
+          </p:cNvPr>
+          <p:cNvSpPr/>
+          <p:nvPr/>
+        </p:nvSpPr>
+        <p:spPr>
+          <a:xfrm>
+            <a:off x="-10835" y="127910"/>
+            <a:ext cx="2110331" cy="639964"/>
+          </a:xfrm>
+          <a:prstGeom prst="rightArrow">
+            <a:avLst>
+              <a:gd name="adj1" fmla="val 50000"/>
+              <a:gd name="adj2" fmla="val 48926"/>
+            </a:avLst>
+          </a:prstGeom>
+          <a:solidFill>
+            <a:srgbClr val="7030A0"/>
+          </a:solidFill>
+        </p:spPr>
+        <p:style>
+          <a:lnRef idx="2">
+            <a:schemeClr val="accent4">
+              <a:shade val="50000"/>
+            </a:schemeClr>
+          </a:lnRef>
+          <a:fillRef idx="1">
+            <a:schemeClr val="accent4"/>
+          </a:fillRef>
+          <a:effectRef idx="0">
+            <a:schemeClr val="accent4"/>
+          </a:effectRef>
+          <a:fontRef idx="minor">
+            <a:schemeClr val="lt1"/>
+          </a:fontRef>
+        </p:style>
+        <p:txBody>
+          <a:bodyPr rtlCol="0" anchor="ctr"/>
+          <a:lstStyle/>
+          <a:p>
+            <a:pPr algn="ctr"/>
+            <a:r>
+              <a:rPr lang="hu-HU" dirty="0"/>
+              <a:t>SwitchOn</a:t>
+            </a:r>
+          </a:p>
+        </p:txBody>
+      </p:sp>
+      <p:sp>
+        <p:nvSpPr>
+          <p:cNvPr id="59" name="Téglalap: lekerekített 58">
+            <a:extLst>
+              <a:ext uri="{FF2B5EF4-FFF2-40B4-BE49-F238E27FC236}">
+                <a16:creationId xmlns:a16="http://schemas.microsoft.com/office/drawing/2014/main" id="{33BD642F-9F46-49B9-B590-50BBAF533DFD}"/>
+              </a:ext>
+            </a:extLst>
+          </p:cNvPr>
+          <p:cNvSpPr/>
+          <p:nvPr/>
+        </p:nvSpPr>
+        <p:spPr>
+          <a:xfrm>
+            <a:off x="2299220" y="1454238"/>
+            <a:ext cx="1347843" cy="623772"/>
+          </a:xfrm>
+          <a:prstGeom prst="roundRect">
+            <a:avLst/>
+          </a:prstGeom>
+        </p:spPr>
+        <p:style>
+          <a:lnRef idx="2">
+            <a:schemeClr val="accent1">
+              <a:shade val="50000"/>
+            </a:schemeClr>
+          </a:lnRef>
+          <a:fillRef idx="1">
+            <a:schemeClr val="accent1"/>
+          </a:fillRef>
+          <a:effectRef idx="0">
+            <a:schemeClr val="accent1"/>
+          </a:effectRef>
+          <a:fontRef idx="minor">
+            <a:schemeClr val="lt1"/>
+          </a:fontRef>
+        </p:style>
+        <p:txBody>
+          <a:bodyPr rtlCol="0" anchor="ctr"/>
+          <a:lstStyle/>
+          <a:p>
+            <a:pPr algn="ctr"/>
+            <a:r>
+              <a:rPr lang="hu-HU" dirty="0"/>
+              <a:t>Inactive</a:t>
+            </a:r>
+          </a:p>
+        </p:txBody>
+      </p:sp>
+      <p:sp>
+        <p:nvSpPr>
+          <p:cNvPr id="92" name="Nyíl: jobbra mutató 91">
+            <a:extLst>
+              <a:ext uri="{FF2B5EF4-FFF2-40B4-BE49-F238E27FC236}">
+                <a16:creationId xmlns:a16="http://schemas.microsoft.com/office/drawing/2014/main" id="{DFD3DC01-1D32-42DD-A857-14259C1A7204}"/>
+              </a:ext>
+            </a:extLst>
+          </p:cNvPr>
+          <p:cNvSpPr/>
+          <p:nvPr/>
+        </p:nvSpPr>
+        <p:spPr>
+          <a:xfrm>
+            <a:off x="-12056" y="1446142"/>
+            <a:ext cx="2110331" cy="639964"/>
+          </a:xfrm>
+          <a:prstGeom prst="rightArrow">
+            <a:avLst>
+              <a:gd name="adj1" fmla="val 50000"/>
+              <a:gd name="adj2" fmla="val 48926"/>
+            </a:avLst>
+          </a:prstGeom>
+          <a:solidFill>
+            <a:srgbClr val="7030A0"/>
+          </a:solidFill>
+        </p:spPr>
+        <p:style>
+          <a:lnRef idx="2">
+            <a:schemeClr val="accent1">
+              <a:shade val="50000"/>
+            </a:schemeClr>
+          </a:lnRef>
+          <a:fillRef idx="1">
+            <a:schemeClr val="accent1"/>
+          </a:fillRef>
+          <a:effectRef idx="0">
+            <a:schemeClr val="accent1"/>
+          </a:effectRef>
+          <a:fontRef idx="minor">
+            <a:schemeClr val="lt1"/>
+          </a:fontRef>
+        </p:style>
+        <p:txBody>
+          <a:bodyPr rtlCol="0" anchor="ctr"/>
+          <a:lstStyle/>
+          <a:p>
+            <a:pPr algn="ctr"/>
+            <a:r>
+              <a:rPr lang="hu-HU" dirty="0"/>
+              <a:t>SwOperation</a:t>
+            </a:r>
+          </a:p>
+        </p:txBody>
+      </p:sp>
+      <p:sp>
+        <p:nvSpPr>
+          <p:cNvPr id="71" name="Téglalap: lekerekített 70">
+            <a:extLst>
+              <a:ext uri="{FF2B5EF4-FFF2-40B4-BE49-F238E27FC236}">
+                <a16:creationId xmlns:a16="http://schemas.microsoft.com/office/drawing/2014/main" id="{5F30BA73-812D-4BF9-97AF-03A3170AF4AD}"/>
+              </a:ext>
+            </a:extLst>
+          </p:cNvPr>
+          <p:cNvSpPr/>
+          <p:nvPr/>
+        </p:nvSpPr>
+        <p:spPr>
+          <a:xfrm>
+            <a:off x="2297999" y="2775692"/>
+            <a:ext cx="1347843" cy="623772"/>
+          </a:xfrm>
+          <a:prstGeom prst="roundRect">
+            <a:avLst/>
+          </a:prstGeom>
+        </p:spPr>
+        <p:style>
+          <a:lnRef idx="2">
+            <a:schemeClr val="accent1">
+              <a:shade val="50000"/>
+            </a:schemeClr>
+          </a:lnRef>
+          <a:fillRef idx="1">
+            <a:schemeClr val="accent1"/>
+          </a:fillRef>
+          <a:effectRef idx="0">
+            <a:schemeClr val="accent1"/>
+          </a:effectRef>
+          <a:fontRef idx="minor">
+            <a:schemeClr val="lt1"/>
+          </a:fontRef>
+        </p:style>
+        <p:txBody>
+          <a:bodyPr rtlCol="0" anchor="ctr"/>
+          <a:lstStyle/>
+          <a:p>
+            <a:pPr algn="ctr"/>
+            <a:r>
+              <a:rPr lang="hu-HU" dirty="0"/>
+              <a:t>Inactive</a:t>
+            </a:r>
+          </a:p>
+        </p:txBody>
+      </p:sp>
+      <p:sp>
+        <p:nvSpPr>
+          <p:cNvPr id="93" name="Nyíl: jobbra mutató 92">
+            <a:extLst>
+              <a:ext uri="{FF2B5EF4-FFF2-40B4-BE49-F238E27FC236}">
+                <a16:creationId xmlns:a16="http://schemas.microsoft.com/office/drawing/2014/main" id="{6A8CBD9A-B70B-4984-9F6F-ADA30D5B37C4}"/>
+              </a:ext>
+            </a:extLst>
+          </p:cNvPr>
+          <p:cNvSpPr/>
+          <p:nvPr/>
+        </p:nvSpPr>
+        <p:spPr>
+          <a:xfrm>
+            <a:off x="-12056" y="2740172"/>
+            <a:ext cx="2110331" cy="639964"/>
+          </a:xfrm>
+          <a:prstGeom prst="rightArrow">
+            <a:avLst>
+              <a:gd name="adj1" fmla="val 50000"/>
+              <a:gd name="adj2" fmla="val 48926"/>
+            </a:avLst>
+          </a:prstGeom>
+          <a:solidFill>
+            <a:srgbClr val="7030A0"/>
+          </a:solidFill>
+        </p:spPr>
+        <p:style>
+          <a:lnRef idx="2">
+            <a:schemeClr val="accent1">
+              <a:shade val="50000"/>
+            </a:schemeClr>
+          </a:lnRef>
+          <a:fillRef idx="1">
+            <a:schemeClr val="accent1"/>
+          </a:fillRef>
+          <a:effectRef idx="0">
+            <a:schemeClr val="accent1"/>
+          </a:effectRef>
+          <a:fontRef idx="minor">
+            <a:schemeClr val="lt1"/>
+          </a:fontRef>
+        </p:style>
+        <p:txBody>
+          <a:bodyPr rtlCol="0" anchor="ctr"/>
+          <a:lstStyle/>
+          <a:p>
+            <a:pPr algn="ctr"/>
+            <a:r>
+              <a:rPr lang="hu-HU" dirty="0"/>
+              <a:t>PMaterial</a:t>
+            </a:r>
+          </a:p>
+        </p:txBody>
+      </p:sp>
+      <p:sp>
+        <p:nvSpPr>
+          <p:cNvPr id="80" name="Téglalap: lekerekített 79">
+            <a:extLst>
+              <a:ext uri="{FF2B5EF4-FFF2-40B4-BE49-F238E27FC236}">
+                <a16:creationId xmlns:a16="http://schemas.microsoft.com/office/drawing/2014/main" id="{AF38A041-AB8A-4697-91DC-20D894BD62D5}"/>
+              </a:ext>
+            </a:extLst>
+          </p:cNvPr>
+          <p:cNvSpPr/>
+          <p:nvPr/>
+        </p:nvSpPr>
+        <p:spPr>
+          <a:xfrm>
+            <a:off x="2329284" y="4132575"/>
+            <a:ext cx="1347843" cy="623772"/>
+          </a:xfrm>
+          <a:prstGeom prst="roundRect">
+            <a:avLst/>
+          </a:prstGeom>
+        </p:spPr>
+        <p:style>
+          <a:lnRef idx="2">
+            <a:schemeClr val="accent1">
+              <a:shade val="50000"/>
+            </a:schemeClr>
+          </a:lnRef>
+          <a:fillRef idx="1">
+            <a:schemeClr val="accent1"/>
+          </a:fillRef>
+          <a:effectRef idx="0">
+            <a:schemeClr val="accent1"/>
+          </a:effectRef>
+          <a:fontRef idx="minor">
+            <a:schemeClr val="lt1"/>
+          </a:fontRef>
+        </p:style>
+        <p:txBody>
+          <a:bodyPr rtlCol="0" anchor="ctr"/>
+          <a:lstStyle/>
+          <a:p>
+            <a:pPr algn="ctr"/>
+            <a:r>
+              <a:rPr lang="hu-HU" dirty="0"/>
+              <a:t>Inactive</a:t>
+            </a:r>
+          </a:p>
+        </p:txBody>
+      </p:sp>
+      <p:sp>
+        <p:nvSpPr>
+          <p:cNvPr id="94" name="Nyíl: jobbra mutató 93">
+            <a:extLst>
+              <a:ext uri="{FF2B5EF4-FFF2-40B4-BE49-F238E27FC236}">
+                <a16:creationId xmlns:a16="http://schemas.microsoft.com/office/drawing/2014/main" id="{93A4A652-F670-42F4-B092-5479B568433C}"/>
+              </a:ext>
+            </a:extLst>
+          </p:cNvPr>
+          <p:cNvSpPr/>
+          <p:nvPr/>
+        </p:nvSpPr>
+        <p:spPr>
+          <a:xfrm>
+            <a:off x="0" y="4164385"/>
+            <a:ext cx="2110331" cy="639964"/>
+          </a:xfrm>
+          <a:prstGeom prst="rightArrow">
+            <a:avLst>
+              <a:gd name="adj1" fmla="val 50000"/>
+              <a:gd name="adj2" fmla="val 48926"/>
+            </a:avLst>
+          </a:prstGeom>
+          <a:solidFill>
+            <a:srgbClr val="7030A0"/>
+          </a:solidFill>
+        </p:spPr>
+        <p:style>
+          <a:lnRef idx="2">
+            <a:schemeClr val="accent1">
+              <a:shade val="50000"/>
+            </a:schemeClr>
+          </a:lnRef>
+          <a:fillRef idx="1">
+            <a:schemeClr val="accent1"/>
+          </a:fillRef>
+          <a:effectRef idx="0">
+            <a:schemeClr val="accent1"/>
+          </a:effectRef>
+          <a:fontRef idx="minor">
+            <a:schemeClr val="lt1"/>
+          </a:fontRef>
+        </p:style>
+        <p:txBody>
+          <a:bodyPr rtlCol="0" anchor="ctr"/>
+          <a:lstStyle/>
+          <a:p>
+            <a:pPr algn="ctr"/>
+            <a:r>
+              <a:rPr lang="hu-HU" dirty="0"/>
+              <a:t>SwMaintenance</a:t>
+            </a:r>
+          </a:p>
+        </p:txBody>
+      </p:sp>
+      <p:sp>
+        <p:nvSpPr>
+          <p:cNvPr id="100" name="Nyíl: lefelé mutató 99">
+            <a:extLst>
+              <a:ext uri="{FF2B5EF4-FFF2-40B4-BE49-F238E27FC236}">
+                <a16:creationId xmlns:a16="http://schemas.microsoft.com/office/drawing/2014/main" id="{0DF64AC9-4337-48C9-B2A6-22DC046AD487}"/>
+              </a:ext>
+            </a:extLst>
+          </p:cNvPr>
+          <p:cNvSpPr/>
+          <p:nvPr/>
+        </p:nvSpPr>
+        <p:spPr>
+          <a:xfrm>
+            <a:off x="4859201" y="904593"/>
+            <a:ext cx="1123937" cy="438370"/>
+          </a:xfrm>
+          <a:prstGeom prst="downArrow">
+            <a:avLst/>
+          </a:prstGeom>
+        </p:spPr>
+        <p:style>
+          <a:lnRef idx="2">
+            <a:schemeClr val="accent6">
+              <a:shade val="50000"/>
+            </a:schemeClr>
+          </a:lnRef>
+          <a:fillRef idx="1">
+            <a:schemeClr val="accent6"/>
+          </a:fillRef>
+          <a:effectRef idx="0">
+            <a:schemeClr val="accent6"/>
+          </a:effectRef>
+          <a:fontRef idx="minor">
+            <a:schemeClr val="lt1"/>
+          </a:fontRef>
+        </p:style>
+        <p:txBody>
+          <a:bodyPr rtlCol="0" anchor="ctr"/>
+          <a:lstStyle/>
+          <a:p>
+            <a:pPr algn="ctr"/>
+            <a:endParaRPr lang="hu-HU" dirty="0"/>
+          </a:p>
+        </p:txBody>
+      </p:sp>
+      <p:sp>
+        <p:nvSpPr>
+          <p:cNvPr id="101" name="Nyíl: lefelé mutató 100">
+            <a:extLst>
+              <a:ext uri="{FF2B5EF4-FFF2-40B4-BE49-F238E27FC236}">
+                <a16:creationId xmlns:a16="http://schemas.microsoft.com/office/drawing/2014/main" id="{1860CCE8-468D-4E00-8D18-BAA1319C65D7}"/>
+              </a:ext>
+            </a:extLst>
+          </p:cNvPr>
+          <p:cNvSpPr/>
+          <p:nvPr/>
+        </p:nvSpPr>
+        <p:spPr>
+          <a:xfrm>
+            <a:off x="4859199" y="2232139"/>
+            <a:ext cx="1123937" cy="438370"/>
+          </a:xfrm>
+          <a:prstGeom prst="downArrow">
+            <a:avLst/>
+          </a:prstGeom>
+        </p:spPr>
+        <p:style>
+          <a:lnRef idx="2">
+            <a:schemeClr val="accent6">
+              <a:shade val="50000"/>
+            </a:schemeClr>
+          </a:lnRef>
+          <a:fillRef idx="1">
+            <a:schemeClr val="accent6"/>
+          </a:fillRef>
+          <a:effectRef idx="0">
+            <a:schemeClr val="accent6"/>
+          </a:effectRef>
+          <a:fontRef idx="minor">
+            <a:schemeClr val="lt1"/>
+          </a:fontRef>
+        </p:style>
+        <p:txBody>
+          <a:bodyPr rtlCol="0" anchor="ctr"/>
+          <a:lstStyle/>
+          <a:p>
+            <a:pPr algn="ctr"/>
+            <a:endParaRPr lang="hu-HU"/>
+          </a:p>
+        </p:txBody>
+      </p:sp>
+      <p:sp>
+        <p:nvSpPr>
+          <p:cNvPr id="102" name="Nyíl: lefelé mutató 101">
+            <a:extLst>
+              <a:ext uri="{FF2B5EF4-FFF2-40B4-BE49-F238E27FC236}">
+                <a16:creationId xmlns:a16="http://schemas.microsoft.com/office/drawing/2014/main" id="{C01154A2-C09E-42EB-9C02-0A90F470AB3D}"/>
+              </a:ext>
+            </a:extLst>
+          </p:cNvPr>
+          <p:cNvSpPr/>
+          <p:nvPr/>
+        </p:nvSpPr>
+        <p:spPr>
+          <a:xfrm>
+            <a:off x="4859200" y="3542749"/>
+            <a:ext cx="1123937" cy="438370"/>
+          </a:xfrm>
+          <a:prstGeom prst="downArrow">
+            <a:avLst/>
+          </a:prstGeom>
+        </p:spPr>
+        <p:style>
+          <a:lnRef idx="2">
+            <a:schemeClr val="accent6">
+              <a:shade val="50000"/>
+            </a:schemeClr>
+          </a:lnRef>
+          <a:fillRef idx="1">
+            <a:schemeClr val="accent6"/>
+          </a:fillRef>
+          <a:effectRef idx="0">
+            <a:schemeClr val="accent6"/>
+          </a:effectRef>
+          <a:fontRef idx="minor">
+            <a:schemeClr val="lt1"/>
+          </a:fontRef>
+        </p:style>
+        <p:txBody>
+          <a:bodyPr rtlCol="0" anchor="ctr"/>
+          <a:lstStyle/>
+          <a:p>
+            <a:pPr algn="ctr"/>
+            <a:endParaRPr lang="hu-HU"/>
+          </a:p>
+        </p:txBody>
+      </p:sp>
+      <p:sp>
+        <p:nvSpPr>
+          <p:cNvPr id="114" name="Nyíl: lefelé mutató 113">
+            <a:extLst>
+              <a:ext uri="{FF2B5EF4-FFF2-40B4-BE49-F238E27FC236}">
+                <a16:creationId xmlns:a16="http://schemas.microsoft.com/office/drawing/2014/main" id="{E8884891-F7D4-4A5A-9676-319308FD723E}"/>
+              </a:ext>
+            </a:extLst>
+          </p:cNvPr>
+          <p:cNvSpPr/>
+          <p:nvPr/>
+        </p:nvSpPr>
+        <p:spPr>
+          <a:xfrm>
+            <a:off x="4859200" y="4922603"/>
+            <a:ext cx="1123937" cy="438370"/>
+          </a:xfrm>
+          <a:prstGeom prst="downArrow">
+            <a:avLst/>
+          </a:prstGeom>
+        </p:spPr>
+        <p:style>
+          <a:lnRef idx="2">
+            <a:schemeClr val="accent6">
+              <a:shade val="50000"/>
+            </a:schemeClr>
+          </a:lnRef>
+          <a:fillRef idx="1">
+            <a:schemeClr val="accent6"/>
+          </a:fillRef>
+          <a:effectRef idx="0">
+            <a:schemeClr val="accent6"/>
+          </a:effectRef>
+          <a:fontRef idx="minor">
+            <a:schemeClr val="lt1"/>
+          </a:fontRef>
+        </p:style>
+        <p:txBody>
+          <a:bodyPr rtlCol="0" anchor="ctr"/>
+          <a:lstStyle/>
+          <a:p>
+            <a:pPr algn="ctr"/>
+            <a:endParaRPr lang="hu-HU"/>
+          </a:p>
+        </p:txBody>
+      </p:sp>
+      <p:grpSp>
+        <p:nvGrpSpPr>
+          <p:cNvPr id="137" name="Csoportba foglalás 136">
+            <a:extLst>
+              <a:ext uri="{FF2B5EF4-FFF2-40B4-BE49-F238E27FC236}">
+                <a16:creationId xmlns:a16="http://schemas.microsoft.com/office/drawing/2014/main" id="{B1F59DBE-A0A1-40F2-AADA-23158A82765B}"/>
+              </a:ext>
+            </a:extLst>
+          </p:cNvPr>
+          <p:cNvGrpSpPr/>
+          <p:nvPr/>
+        </p:nvGrpSpPr>
+        <p:grpSpPr>
+          <a:xfrm>
+            <a:off x="3922990" y="101483"/>
+            <a:ext cx="6664105" cy="666391"/>
+            <a:chOff x="3922990" y="101483"/>
+            <a:chExt cx="6664105" cy="666391"/>
+          </a:xfrm>
+        </p:grpSpPr>
+        <p:grpSp>
+          <p:nvGrpSpPr>
+            <p:cNvPr id="127" name="Csoportba foglalás 126">
+              <a:extLst>
+                <a:ext uri="{FF2B5EF4-FFF2-40B4-BE49-F238E27FC236}">
+                  <a16:creationId xmlns:a16="http://schemas.microsoft.com/office/drawing/2014/main" id="{15BF4A86-61DC-4A44-AB13-991F8F921CC0}"/>
+                </a:ext>
+              </a:extLst>
+            </p:cNvPr>
+            <p:cNvGrpSpPr/>
+            <p:nvPr/>
+          </p:nvGrpSpPr>
+          <p:grpSpPr>
+            <a:xfrm>
+              <a:off x="3922990" y="111042"/>
+              <a:ext cx="6664105" cy="656832"/>
+              <a:chOff x="3922990" y="111042"/>
+              <a:chExt cx="6664105" cy="656832"/>
+            </a:xfrm>
+          </p:grpSpPr>
+          <p:sp>
+            <p:nvSpPr>
+              <p:cNvPr id="42" name="Téglalap: lekerekített 41">
+                <a:extLst>
+                  <a:ext uri="{FF2B5EF4-FFF2-40B4-BE49-F238E27FC236}">
+                    <a16:creationId xmlns:a16="http://schemas.microsoft.com/office/drawing/2014/main" id="{65C4B9B3-6DF9-4EEC-95D4-F837C4C9F769}"/>
+                  </a:ext>
+                </a:extLst>
+              </p:cNvPr>
+              <p:cNvSpPr/>
+              <p:nvPr/>
+            </p:nvSpPr>
+            <p:spPr>
+              <a:xfrm>
+                <a:off x="3922990" y="111042"/>
+                <a:ext cx="6664105" cy="656832"/>
+              </a:xfrm>
+              <a:prstGeom prst="roundRect">
+                <a:avLst/>
+              </a:prstGeom>
+            </p:spPr>
+            <p:style>
+              <a:lnRef idx="2">
+                <a:schemeClr val="accent1">
+                  <a:shade val="50000"/>
+                </a:schemeClr>
+              </a:lnRef>
+              <a:fillRef idx="1">
+                <a:schemeClr val="accent1"/>
+              </a:fillRef>
+              <a:effectRef idx="0">
+                <a:schemeClr val="accent1"/>
+              </a:effectRef>
+              <a:fontRef idx="minor">
+                <a:schemeClr val="lt1"/>
+              </a:fontRef>
+            </p:style>
+            <p:txBody>
+              <a:bodyPr rtlCol="0" anchor="ctr"/>
+              <a:lstStyle/>
+              <a:p>
+                <a:pPr algn="ctr"/>
+                <a:endParaRPr lang="hu-HU" dirty="0"/>
+              </a:p>
+            </p:txBody>
+          </p:sp>
+          <p:sp>
+            <p:nvSpPr>
+              <p:cNvPr id="125" name="Téglalap: lekerekített 124">
+                <a:extLst>
+                  <a:ext uri="{FF2B5EF4-FFF2-40B4-BE49-F238E27FC236}">
+                    <a16:creationId xmlns:a16="http://schemas.microsoft.com/office/drawing/2014/main" id="{DDC0736C-43B1-496F-B6F8-F33726463FB0}"/>
+                  </a:ext>
+                </a:extLst>
+              </p:cNvPr>
+              <p:cNvSpPr/>
+              <p:nvPr/>
+            </p:nvSpPr>
+            <p:spPr>
+              <a:xfrm>
+                <a:off x="5006695" y="144433"/>
+                <a:ext cx="2727605" cy="581953"/>
+              </a:xfrm>
+              <a:prstGeom prst="roundRect">
+                <a:avLst/>
+              </a:prstGeom>
+              <a:solidFill>
+                <a:schemeClr val="bg1"/>
+              </a:solidFill>
+            </p:spPr>
+            <p:style>
+              <a:lnRef idx="2">
+                <a:schemeClr val="accent1">
+                  <a:shade val="50000"/>
+                </a:schemeClr>
+              </a:lnRef>
+              <a:fillRef idx="1">
+                <a:schemeClr val="accent1"/>
+              </a:fillRef>
+              <a:effectRef idx="0">
+                <a:schemeClr val="accent1"/>
+              </a:effectRef>
+              <a:fontRef idx="minor">
+                <a:schemeClr val="lt1"/>
+              </a:fontRef>
+            </p:style>
+            <p:txBody>
+              <a:bodyPr rtlCol="0" anchor="ctr"/>
+              <a:lstStyle/>
+              <a:p>
+                <a:pPr algn="ctr"/>
+                <a:endParaRPr lang="hu-HU" dirty="0"/>
+              </a:p>
+            </p:txBody>
+          </p:sp>
+          <p:sp>
+            <p:nvSpPr>
+              <p:cNvPr id="38" name="Ellipszis 37">
+                <a:extLst>
+                  <a:ext uri="{FF2B5EF4-FFF2-40B4-BE49-F238E27FC236}">
+                    <a16:creationId xmlns:a16="http://schemas.microsoft.com/office/drawing/2014/main" id="{69D6CED8-8589-4FDA-847C-14F5BFE87012}"/>
+                  </a:ext>
+                </a:extLst>
+              </p:cNvPr>
+              <p:cNvSpPr/>
+              <p:nvPr/>
+            </p:nvSpPr>
+            <p:spPr>
+              <a:xfrm>
+                <a:off x="6381593" y="160317"/>
+                <a:ext cx="1330349" cy="543960"/>
+              </a:xfrm>
+              <a:prstGeom prst="ellipse">
+                <a:avLst/>
+              </a:prstGeom>
+            </p:spPr>
+            <p:style>
+              <a:lnRef idx="2">
+                <a:schemeClr val="accent5">
+                  <a:shade val="50000"/>
+                </a:schemeClr>
+              </a:lnRef>
+              <a:fillRef idx="1">
+                <a:schemeClr val="accent5"/>
+              </a:fillRef>
+              <a:effectRef idx="0">
+                <a:schemeClr val="accent5"/>
+              </a:effectRef>
+              <a:fontRef idx="minor">
+                <a:schemeClr val="lt1"/>
+              </a:fontRef>
+            </p:style>
+            <p:txBody>
+              <a:bodyPr rtlCol="0" anchor="ctr"/>
+              <a:lstStyle/>
+              <a:p>
+                <a:pPr algn="ctr"/>
+                <a:r>
+                  <a:rPr lang="hu-HU" dirty="0"/>
+                  <a:t>Oper.</a:t>
+                </a:r>
+              </a:p>
+            </p:txBody>
+          </p:sp>
+          <p:sp>
+            <p:nvSpPr>
+              <p:cNvPr id="37" name="Ellipszis 36">
+                <a:extLst>
+                  <a:ext uri="{FF2B5EF4-FFF2-40B4-BE49-F238E27FC236}">
+                    <a16:creationId xmlns:a16="http://schemas.microsoft.com/office/drawing/2014/main" id="{7CE69247-80EA-4102-9992-F0E473F5D571}"/>
+                  </a:ext>
+                </a:extLst>
+              </p:cNvPr>
+              <p:cNvSpPr/>
+              <p:nvPr/>
+            </p:nvSpPr>
+            <p:spPr>
+              <a:xfrm>
+                <a:off x="5029574" y="149743"/>
+                <a:ext cx="1330349" cy="543960"/>
+              </a:xfrm>
+              <a:prstGeom prst="ellipse">
+                <a:avLst/>
+              </a:prstGeom>
+            </p:spPr>
+            <p:style>
+              <a:lnRef idx="2">
+                <a:schemeClr val="accent5">
+                  <a:shade val="50000"/>
+                </a:schemeClr>
+              </a:lnRef>
+              <a:fillRef idx="1">
+                <a:schemeClr val="accent5"/>
+              </a:fillRef>
+              <a:effectRef idx="0">
+                <a:schemeClr val="accent5"/>
+              </a:effectRef>
+              <a:fontRef idx="minor">
+                <a:schemeClr val="lt1"/>
+              </a:fontRef>
+            </p:style>
+            <p:txBody>
+              <a:bodyPr rtlCol="0" anchor="ctr"/>
+              <a:lstStyle/>
+              <a:p>
+                <a:pPr algn="ctr"/>
+                <a:r>
+                  <a:rPr lang="hu-HU" dirty="0"/>
+                  <a:t>Maint.</a:t>
+                </a:r>
+              </a:p>
+            </p:txBody>
+          </p:sp>
+          <p:sp>
+            <p:nvSpPr>
+              <p:cNvPr id="126" name="Téglalap: lekerekített 125">
+                <a:extLst>
+                  <a:ext uri="{FF2B5EF4-FFF2-40B4-BE49-F238E27FC236}">
+                    <a16:creationId xmlns:a16="http://schemas.microsoft.com/office/drawing/2014/main" id="{F8EDA16E-3B80-4A6E-BB5B-3C1C9C6B1DFB}"/>
+                  </a:ext>
+                </a:extLst>
+              </p:cNvPr>
+              <p:cNvSpPr/>
+              <p:nvPr/>
+            </p:nvSpPr>
+            <p:spPr>
+              <a:xfrm>
+                <a:off x="7837021" y="153676"/>
+                <a:ext cx="2727605" cy="581953"/>
+              </a:xfrm>
+              <a:prstGeom prst="roundRect">
+                <a:avLst/>
+              </a:prstGeom>
+              <a:solidFill>
+                <a:schemeClr val="bg1"/>
+              </a:solidFill>
+            </p:spPr>
+            <p:style>
+              <a:lnRef idx="2">
+                <a:schemeClr val="accent1">
+                  <a:shade val="50000"/>
+                </a:schemeClr>
+              </a:lnRef>
+              <a:fillRef idx="1">
+                <a:schemeClr val="accent1"/>
+              </a:fillRef>
+              <a:effectRef idx="0">
+                <a:schemeClr val="accent1"/>
+              </a:effectRef>
+              <a:fontRef idx="minor">
+                <a:schemeClr val="lt1"/>
+              </a:fontRef>
+            </p:style>
+            <p:txBody>
+              <a:bodyPr rtlCol="0" anchor="ctr"/>
+              <a:lstStyle/>
+              <a:p>
+                <a:pPr algn="ctr"/>
+                <a:endParaRPr lang="hu-HU" dirty="0"/>
+              </a:p>
+            </p:txBody>
+          </p:sp>
+          <p:sp>
+            <p:nvSpPr>
+              <p:cNvPr id="39" name="Ellipszis 38">
+                <a:extLst>
+                  <a:ext uri="{FF2B5EF4-FFF2-40B4-BE49-F238E27FC236}">
+                    <a16:creationId xmlns:a16="http://schemas.microsoft.com/office/drawing/2014/main" id="{E659B070-8502-4F89-B5FF-D3C18AE50BAE}"/>
+                  </a:ext>
+                </a:extLst>
+              </p:cNvPr>
+              <p:cNvSpPr/>
+              <p:nvPr/>
+            </p:nvSpPr>
+            <p:spPr>
+              <a:xfrm>
+                <a:off x="7865619" y="163430"/>
+                <a:ext cx="1330349" cy="543960"/>
+              </a:xfrm>
+              <a:prstGeom prst="ellipse">
+                <a:avLst/>
+              </a:prstGeom>
+            </p:spPr>
+            <p:style>
+              <a:lnRef idx="2">
+                <a:schemeClr val="accent5">
+                  <a:shade val="50000"/>
+                </a:schemeClr>
+              </a:lnRef>
+              <a:fillRef idx="1">
+                <a:schemeClr val="accent5"/>
+              </a:fillRef>
+              <a:effectRef idx="0">
+                <a:schemeClr val="accent5"/>
+              </a:effectRef>
+              <a:fontRef idx="minor">
+                <a:schemeClr val="lt1"/>
+              </a:fontRef>
+            </p:style>
+            <p:txBody>
+              <a:bodyPr rtlCol="0" anchor="ctr"/>
+              <a:lstStyle/>
+              <a:p>
+                <a:pPr algn="ctr"/>
+                <a:r>
+                  <a:rPr lang="hu-HU" dirty="0"/>
+                  <a:t>Idle</a:t>
+                </a:r>
+              </a:p>
+            </p:txBody>
+          </p:sp>
+          <p:sp>
+            <p:nvSpPr>
+              <p:cNvPr id="40" name="Ellipszis 39">
+                <a:extLst>
+                  <a:ext uri="{FF2B5EF4-FFF2-40B4-BE49-F238E27FC236}">
+                    <a16:creationId xmlns:a16="http://schemas.microsoft.com/office/drawing/2014/main" id="{DB1BA913-AE2C-466A-A817-B41F5CDBFD8E}"/>
+                  </a:ext>
+                </a:extLst>
+              </p:cNvPr>
+              <p:cNvSpPr/>
+              <p:nvPr/>
+            </p:nvSpPr>
+            <p:spPr>
+              <a:xfrm>
+                <a:off x="9217638" y="174707"/>
+                <a:ext cx="1330349" cy="543960"/>
+              </a:xfrm>
+              <a:prstGeom prst="ellipse">
+                <a:avLst/>
+              </a:prstGeom>
+            </p:spPr>
+            <p:style>
+              <a:lnRef idx="2">
+                <a:schemeClr val="accent5">
+                  <a:shade val="50000"/>
+                </a:schemeClr>
+              </a:lnRef>
+              <a:fillRef idx="1">
+                <a:schemeClr val="accent5"/>
+              </a:fillRef>
+              <a:effectRef idx="0">
+                <a:schemeClr val="accent5"/>
+              </a:effectRef>
+              <a:fontRef idx="minor">
+                <a:schemeClr val="lt1"/>
+              </a:fontRef>
+            </p:style>
+            <p:txBody>
+              <a:bodyPr rtlCol="0" anchor="ctr"/>
+              <a:lstStyle/>
+              <a:p>
+                <a:pPr algn="ctr"/>
+                <a:r>
+                  <a:rPr lang="hu-HU" dirty="0"/>
+                  <a:t>Proc.</a:t>
+                </a:r>
+              </a:p>
+            </p:txBody>
+          </p:sp>
+        </p:grpSp>
+        <p:sp>
+          <p:nvSpPr>
+            <p:cNvPr id="136" name="Szövegdoboz 135">
+              <a:extLst>
+                <a:ext uri="{FF2B5EF4-FFF2-40B4-BE49-F238E27FC236}">
+                  <a16:creationId xmlns:a16="http://schemas.microsoft.com/office/drawing/2014/main" id="{452CDEDA-3322-424D-8240-19F991156827}"/>
+                </a:ext>
+              </a:extLst>
+            </p:cNvPr>
+            <p:cNvSpPr txBox="1"/>
+            <p:nvPr/>
+          </p:nvSpPr>
+          <p:spPr>
+            <a:xfrm>
+              <a:off x="3931310" y="101483"/>
+              <a:ext cx="980984" cy="369332"/>
+            </a:xfrm>
+            <a:prstGeom prst="rect">
+              <a:avLst/>
+            </a:prstGeom>
+            <a:noFill/>
+          </p:spPr>
+          <p:txBody>
+            <a:bodyPr wrap="square" rtlCol="0">
+              <a:spAutoFit/>
+            </a:bodyPr>
+            <a:lstStyle/>
+            <a:p>
+              <a:r>
+                <a:rPr lang="hu-HU" dirty="0">
+                  <a:solidFill>
+                    <a:schemeClr val="bg1"/>
+                  </a:solidFill>
+                </a:rPr>
+                <a:t>Active</a:t>
+              </a:r>
+            </a:p>
+          </p:txBody>
+        </p:sp>
+      </p:grpSp>
+      <p:grpSp>
+        <p:nvGrpSpPr>
+          <p:cNvPr id="138" name="Csoportba foglalás 137">
+            <a:extLst>
+              <a:ext uri="{FF2B5EF4-FFF2-40B4-BE49-F238E27FC236}">
+                <a16:creationId xmlns:a16="http://schemas.microsoft.com/office/drawing/2014/main" id="{BF75BF15-09EC-4CED-8F2D-E7BB142C8FBD}"/>
+              </a:ext>
+            </a:extLst>
+          </p:cNvPr>
+          <p:cNvGrpSpPr/>
+          <p:nvPr/>
+        </p:nvGrpSpPr>
+        <p:grpSpPr>
+          <a:xfrm>
+            <a:off x="3913374" y="1432928"/>
+            <a:ext cx="6664105" cy="666391"/>
+            <a:chOff x="3922990" y="101483"/>
+            <a:chExt cx="6664105" cy="666391"/>
+          </a:xfrm>
+        </p:grpSpPr>
+        <p:grpSp>
+          <p:nvGrpSpPr>
+            <p:cNvPr id="139" name="Csoportba foglalás 138">
+              <a:extLst>
+                <a:ext uri="{FF2B5EF4-FFF2-40B4-BE49-F238E27FC236}">
+                  <a16:creationId xmlns:a16="http://schemas.microsoft.com/office/drawing/2014/main" id="{65E74247-3FB7-4133-BE42-32CAA73AB118}"/>
+                </a:ext>
+              </a:extLst>
+            </p:cNvPr>
+            <p:cNvGrpSpPr/>
+            <p:nvPr/>
+          </p:nvGrpSpPr>
+          <p:grpSpPr>
+            <a:xfrm>
+              <a:off x="3922990" y="111042"/>
+              <a:ext cx="6664105" cy="656832"/>
+              <a:chOff x="3922990" y="111042"/>
+              <a:chExt cx="6664105" cy="656832"/>
+            </a:xfrm>
+          </p:grpSpPr>
+          <p:sp>
+            <p:nvSpPr>
+              <p:cNvPr id="141" name="Téglalap: lekerekített 140">
+                <a:extLst>
+                  <a:ext uri="{FF2B5EF4-FFF2-40B4-BE49-F238E27FC236}">
+                    <a16:creationId xmlns:a16="http://schemas.microsoft.com/office/drawing/2014/main" id="{6E622F10-71B0-4BF4-AAD4-E5813B975490}"/>
+                  </a:ext>
+                </a:extLst>
+              </p:cNvPr>
+              <p:cNvSpPr/>
+              <p:nvPr/>
+            </p:nvSpPr>
+            <p:spPr>
+              <a:xfrm>
+                <a:off x="3922990" y="111042"/>
+                <a:ext cx="6664105" cy="656832"/>
+              </a:xfrm>
+              <a:prstGeom prst="roundRect">
+                <a:avLst/>
+              </a:prstGeom>
+            </p:spPr>
+            <p:style>
+              <a:lnRef idx="2">
+                <a:schemeClr val="accent2">
+                  <a:shade val="50000"/>
+                </a:schemeClr>
+              </a:lnRef>
+              <a:fillRef idx="1">
+                <a:schemeClr val="accent2"/>
+              </a:fillRef>
+              <a:effectRef idx="0">
+                <a:schemeClr val="accent2"/>
+              </a:effectRef>
+              <a:fontRef idx="minor">
+                <a:schemeClr val="lt1"/>
+              </a:fontRef>
+            </p:style>
+            <p:txBody>
+              <a:bodyPr rtlCol="0" anchor="ctr"/>
+              <a:lstStyle/>
+              <a:p>
+                <a:pPr algn="ctr"/>
+                <a:endParaRPr lang="hu-HU" dirty="0"/>
+              </a:p>
+            </p:txBody>
+          </p:sp>
+          <p:sp>
+            <p:nvSpPr>
+              <p:cNvPr id="142" name="Téglalap: lekerekített 141">
+                <a:extLst>
+                  <a:ext uri="{FF2B5EF4-FFF2-40B4-BE49-F238E27FC236}">
+                    <a16:creationId xmlns:a16="http://schemas.microsoft.com/office/drawing/2014/main" id="{A5309F81-647A-4B02-B8EB-FF21CEEEAFB8}"/>
+                  </a:ext>
+                </a:extLst>
+              </p:cNvPr>
+              <p:cNvSpPr/>
+              <p:nvPr/>
+            </p:nvSpPr>
+            <p:spPr>
+              <a:xfrm>
+                <a:off x="5006695" y="144433"/>
+                <a:ext cx="2727605" cy="581953"/>
+              </a:xfrm>
+              <a:prstGeom prst="roundRect">
+                <a:avLst/>
+              </a:prstGeom>
+              <a:solidFill>
+                <a:schemeClr val="bg1"/>
+              </a:solidFill>
+            </p:spPr>
+            <p:style>
+              <a:lnRef idx="2">
+                <a:schemeClr val="accent1">
+                  <a:shade val="50000"/>
+                </a:schemeClr>
+              </a:lnRef>
+              <a:fillRef idx="1">
+                <a:schemeClr val="accent1"/>
+              </a:fillRef>
+              <a:effectRef idx="0">
+                <a:schemeClr val="accent1"/>
+              </a:effectRef>
+              <a:fontRef idx="minor">
+                <a:schemeClr val="lt1"/>
+              </a:fontRef>
+            </p:style>
+            <p:txBody>
+              <a:bodyPr rtlCol="0" anchor="ctr"/>
+              <a:lstStyle/>
+              <a:p>
+                <a:pPr algn="ctr"/>
+                <a:endParaRPr lang="hu-HU" dirty="0"/>
+              </a:p>
+            </p:txBody>
+          </p:sp>
+          <p:sp>
+            <p:nvSpPr>
+              <p:cNvPr id="143" name="Ellipszis 142">
+                <a:extLst>
+                  <a:ext uri="{FF2B5EF4-FFF2-40B4-BE49-F238E27FC236}">
+                    <a16:creationId xmlns:a16="http://schemas.microsoft.com/office/drawing/2014/main" id="{3D107A31-1327-4740-83D0-3C92D1B4BB9C}"/>
+                  </a:ext>
+                </a:extLst>
+              </p:cNvPr>
+              <p:cNvSpPr/>
+              <p:nvPr/>
+            </p:nvSpPr>
+            <p:spPr>
+              <a:xfrm>
+                <a:off x="6381593" y="160317"/>
+                <a:ext cx="1330349" cy="543960"/>
+              </a:xfrm>
+              <a:prstGeom prst="ellipse">
+                <a:avLst/>
+              </a:prstGeom>
+            </p:spPr>
+            <p:style>
+              <a:lnRef idx="2">
+                <a:schemeClr val="accent5">
+                  <a:shade val="50000"/>
+                </a:schemeClr>
+              </a:lnRef>
+              <a:fillRef idx="1">
+                <a:schemeClr val="accent5"/>
+              </a:fillRef>
+              <a:effectRef idx="0">
+                <a:schemeClr val="accent5"/>
+              </a:effectRef>
+              <a:fontRef idx="minor">
+                <a:schemeClr val="lt1"/>
+              </a:fontRef>
+            </p:style>
+            <p:txBody>
+              <a:bodyPr rtlCol="0" anchor="ctr"/>
+              <a:lstStyle/>
+              <a:p>
+                <a:pPr algn="ctr"/>
+                <a:r>
+                  <a:rPr lang="hu-HU" dirty="0"/>
+                  <a:t>Oper.</a:t>
+                </a:r>
+              </a:p>
+            </p:txBody>
+          </p:sp>
+          <p:sp>
+            <p:nvSpPr>
+              <p:cNvPr id="144" name="Ellipszis 143">
+                <a:extLst>
+                  <a:ext uri="{FF2B5EF4-FFF2-40B4-BE49-F238E27FC236}">
+                    <a16:creationId xmlns:a16="http://schemas.microsoft.com/office/drawing/2014/main" id="{38E24A33-9423-43C6-BBE8-B755F0BECB27}"/>
+                  </a:ext>
+                </a:extLst>
+              </p:cNvPr>
+              <p:cNvSpPr/>
+              <p:nvPr/>
+            </p:nvSpPr>
+            <p:spPr>
+              <a:xfrm>
+                <a:off x="5029574" y="149743"/>
+                <a:ext cx="1330349" cy="543960"/>
+              </a:xfrm>
+              <a:prstGeom prst="ellipse">
+                <a:avLst/>
+              </a:prstGeom>
+            </p:spPr>
+            <p:style>
+              <a:lnRef idx="2">
+                <a:schemeClr val="accent2">
+                  <a:shade val="50000"/>
+                </a:schemeClr>
+              </a:lnRef>
+              <a:fillRef idx="1">
+                <a:schemeClr val="accent2"/>
+              </a:fillRef>
+              <a:effectRef idx="0">
+                <a:schemeClr val="accent2"/>
+              </a:effectRef>
+              <a:fontRef idx="minor">
+                <a:schemeClr val="lt1"/>
+              </a:fontRef>
+            </p:style>
+            <p:txBody>
+              <a:bodyPr rtlCol="0" anchor="ctr"/>
+              <a:lstStyle/>
+              <a:p>
+                <a:pPr algn="ctr"/>
+                <a:r>
+                  <a:rPr lang="hu-HU" dirty="0"/>
+                  <a:t>Maint.</a:t>
+                </a:r>
+              </a:p>
+            </p:txBody>
+          </p:sp>
+          <p:sp>
+            <p:nvSpPr>
+              <p:cNvPr id="145" name="Téglalap: lekerekített 144">
+                <a:extLst>
+                  <a:ext uri="{FF2B5EF4-FFF2-40B4-BE49-F238E27FC236}">
+                    <a16:creationId xmlns:a16="http://schemas.microsoft.com/office/drawing/2014/main" id="{20B369A2-9819-4041-9ABA-DE53CB2D8DBB}"/>
+                  </a:ext>
+                </a:extLst>
+              </p:cNvPr>
+              <p:cNvSpPr/>
+              <p:nvPr/>
+            </p:nvSpPr>
+            <p:spPr>
+              <a:xfrm>
+                <a:off x="7837021" y="153676"/>
+                <a:ext cx="2727605" cy="581953"/>
+              </a:xfrm>
+              <a:prstGeom prst="roundRect">
+                <a:avLst/>
+              </a:prstGeom>
+              <a:solidFill>
+                <a:schemeClr val="bg1"/>
+              </a:solidFill>
+            </p:spPr>
+            <p:style>
+              <a:lnRef idx="2">
+                <a:schemeClr val="accent1">
+                  <a:shade val="50000"/>
+                </a:schemeClr>
+              </a:lnRef>
+              <a:fillRef idx="1">
+                <a:schemeClr val="accent1"/>
+              </a:fillRef>
+              <a:effectRef idx="0">
+                <a:schemeClr val="accent1"/>
+              </a:effectRef>
+              <a:fontRef idx="minor">
+                <a:schemeClr val="lt1"/>
+              </a:fontRef>
+            </p:style>
+            <p:txBody>
+              <a:bodyPr rtlCol="0" anchor="ctr"/>
+              <a:lstStyle/>
+              <a:p>
+                <a:pPr algn="ctr"/>
+                <a:endParaRPr lang="hu-HU" dirty="0"/>
+              </a:p>
+            </p:txBody>
+          </p:sp>
+          <p:sp>
+            <p:nvSpPr>
+              <p:cNvPr id="146" name="Ellipszis 145">
+                <a:extLst>
+                  <a:ext uri="{FF2B5EF4-FFF2-40B4-BE49-F238E27FC236}">
+                    <a16:creationId xmlns:a16="http://schemas.microsoft.com/office/drawing/2014/main" id="{BF8F10B2-AE2A-41D7-A015-7540AB7E9566}"/>
+                  </a:ext>
+                </a:extLst>
+              </p:cNvPr>
+              <p:cNvSpPr/>
+              <p:nvPr/>
+            </p:nvSpPr>
+            <p:spPr>
+              <a:xfrm>
+                <a:off x="7865619" y="163430"/>
+                <a:ext cx="1330349" cy="543960"/>
+              </a:xfrm>
+              <a:prstGeom prst="ellipse">
+                <a:avLst/>
+              </a:prstGeom>
+            </p:spPr>
+            <p:style>
+              <a:lnRef idx="2">
+                <a:schemeClr val="accent2">
+                  <a:shade val="50000"/>
+                </a:schemeClr>
+              </a:lnRef>
+              <a:fillRef idx="1">
+                <a:schemeClr val="accent2"/>
+              </a:fillRef>
+              <a:effectRef idx="0">
+                <a:schemeClr val="accent2"/>
+              </a:effectRef>
+              <a:fontRef idx="minor">
+                <a:schemeClr val="lt1"/>
+              </a:fontRef>
+            </p:style>
+            <p:txBody>
+              <a:bodyPr rtlCol="0" anchor="ctr"/>
+              <a:lstStyle/>
+              <a:p>
+                <a:pPr algn="ctr"/>
+                <a:r>
+                  <a:rPr lang="hu-HU" dirty="0"/>
+                  <a:t>Idle</a:t>
+                </a:r>
+              </a:p>
+            </p:txBody>
+          </p:sp>
+          <p:sp>
+            <p:nvSpPr>
+              <p:cNvPr id="147" name="Ellipszis 146">
+                <a:extLst>
+                  <a:ext uri="{FF2B5EF4-FFF2-40B4-BE49-F238E27FC236}">
+                    <a16:creationId xmlns:a16="http://schemas.microsoft.com/office/drawing/2014/main" id="{ECDC6900-71B7-402B-9966-F43A811F1283}"/>
+                  </a:ext>
+                </a:extLst>
+              </p:cNvPr>
+              <p:cNvSpPr/>
+              <p:nvPr/>
+            </p:nvSpPr>
+            <p:spPr>
+              <a:xfrm>
+                <a:off x="9217638" y="174707"/>
+                <a:ext cx="1330349" cy="543960"/>
+              </a:xfrm>
+              <a:prstGeom prst="ellipse">
+                <a:avLst/>
+              </a:prstGeom>
+            </p:spPr>
+            <p:style>
+              <a:lnRef idx="2">
+                <a:schemeClr val="accent5">
+                  <a:shade val="50000"/>
+                </a:schemeClr>
+              </a:lnRef>
+              <a:fillRef idx="1">
+                <a:schemeClr val="accent5"/>
+              </a:fillRef>
+              <a:effectRef idx="0">
+                <a:schemeClr val="accent5"/>
+              </a:effectRef>
+              <a:fontRef idx="minor">
+                <a:schemeClr val="lt1"/>
+              </a:fontRef>
+            </p:style>
+            <p:txBody>
+              <a:bodyPr rtlCol="0" anchor="ctr"/>
+              <a:lstStyle/>
+              <a:p>
+                <a:pPr algn="ctr"/>
+                <a:r>
+                  <a:rPr lang="hu-HU" dirty="0"/>
+                  <a:t>Proc.</a:t>
+                </a:r>
+              </a:p>
+            </p:txBody>
+          </p:sp>
+        </p:grpSp>
+        <p:sp>
+          <p:nvSpPr>
+            <p:cNvPr id="140" name="Szövegdoboz 139">
+              <a:extLst>
+                <a:ext uri="{FF2B5EF4-FFF2-40B4-BE49-F238E27FC236}">
+                  <a16:creationId xmlns:a16="http://schemas.microsoft.com/office/drawing/2014/main" id="{42872070-6C41-489A-8007-AEF9638E9C50}"/>
+                </a:ext>
+              </a:extLst>
+            </p:cNvPr>
+            <p:cNvSpPr txBox="1"/>
+            <p:nvPr/>
+          </p:nvSpPr>
+          <p:spPr>
+            <a:xfrm>
+              <a:off x="3931310" y="101483"/>
+              <a:ext cx="980984" cy="369332"/>
+            </a:xfrm>
+            <a:prstGeom prst="rect">
+              <a:avLst/>
+            </a:prstGeom>
+            <a:noFill/>
+          </p:spPr>
+          <p:txBody>
+            <a:bodyPr wrap="square" rtlCol="0">
+              <a:spAutoFit/>
+            </a:bodyPr>
+            <a:lstStyle/>
+            <a:p>
+              <a:r>
+                <a:rPr lang="hu-HU" dirty="0">
+                  <a:solidFill>
+                    <a:schemeClr val="bg1"/>
+                  </a:solidFill>
+                </a:rPr>
+                <a:t>Active</a:t>
+              </a:r>
+            </a:p>
+          </p:txBody>
+        </p:sp>
+      </p:grpSp>
+      <p:grpSp>
+        <p:nvGrpSpPr>
+          <p:cNvPr id="148" name="Csoportba foglalás 147">
+            <a:extLst>
+              <a:ext uri="{FF2B5EF4-FFF2-40B4-BE49-F238E27FC236}">
+                <a16:creationId xmlns:a16="http://schemas.microsoft.com/office/drawing/2014/main" id="{E69DCCAE-085C-41FD-8075-8198F0DB0C83}"/>
+              </a:ext>
+            </a:extLst>
+          </p:cNvPr>
+          <p:cNvGrpSpPr/>
+          <p:nvPr/>
+        </p:nvGrpSpPr>
+        <p:grpSpPr>
+          <a:xfrm>
+            <a:off x="3890905" y="2754382"/>
+            <a:ext cx="6664105" cy="666391"/>
+            <a:chOff x="3922990" y="101483"/>
+            <a:chExt cx="6664105" cy="666391"/>
+          </a:xfrm>
+        </p:grpSpPr>
+        <p:grpSp>
+          <p:nvGrpSpPr>
+            <p:cNvPr id="149" name="Csoportba foglalás 148">
+              <a:extLst>
+                <a:ext uri="{FF2B5EF4-FFF2-40B4-BE49-F238E27FC236}">
+                  <a16:creationId xmlns:a16="http://schemas.microsoft.com/office/drawing/2014/main" id="{D56B8E1E-86E5-4015-AD81-94BEEECA3D31}"/>
+                </a:ext>
+              </a:extLst>
+            </p:cNvPr>
+            <p:cNvGrpSpPr/>
+            <p:nvPr/>
+          </p:nvGrpSpPr>
+          <p:grpSpPr>
+            <a:xfrm>
+              <a:off x="3922990" y="111042"/>
+              <a:ext cx="6664105" cy="656832"/>
+              <a:chOff x="3922990" y="111042"/>
+              <a:chExt cx="6664105" cy="656832"/>
+            </a:xfrm>
+          </p:grpSpPr>
+          <p:sp>
+            <p:nvSpPr>
+              <p:cNvPr id="151" name="Téglalap: lekerekített 150">
+                <a:extLst>
+                  <a:ext uri="{FF2B5EF4-FFF2-40B4-BE49-F238E27FC236}">
+                    <a16:creationId xmlns:a16="http://schemas.microsoft.com/office/drawing/2014/main" id="{FE927AAC-D3E3-484A-8269-42776928F4BD}"/>
+                  </a:ext>
+                </a:extLst>
+              </p:cNvPr>
+              <p:cNvSpPr/>
+              <p:nvPr/>
+            </p:nvSpPr>
+            <p:spPr>
+              <a:xfrm>
+                <a:off x="3922990" y="111042"/>
+                <a:ext cx="6664105" cy="656832"/>
+              </a:xfrm>
+              <a:prstGeom prst="roundRect">
+                <a:avLst/>
+              </a:prstGeom>
+            </p:spPr>
+            <p:style>
+              <a:lnRef idx="2">
+                <a:schemeClr val="accent2">
+                  <a:shade val="50000"/>
+                </a:schemeClr>
+              </a:lnRef>
+              <a:fillRef idx="1">
+                <a:schemeClr val="accent2"/>
+              </a:fillRef>
+              <a:effectRef idx="0">
+                <a:schemeClr val="accent2"/>
+              </a:effectRef>
+              <a:fontRef idx="minor">
+                <a:schemeClr val="lt1"/>
+              </a:fontRef>
+            </p:style>
+            <p:txBody>
+              <a:bodyPr rtlCol="0" anchor="ctr"/>
+              <a:lstStyle/>
+              <a:p>
+                <a:pPr algn="ctr"/>
+                <a:endParaRPr lang="hu-HU" dirty="0"/>
+              </a:p>
+            </p:txBody>
+          </p:sp>
+          <p:sp>
+            <p:nvSpPr>
+              <p:cNvPr id="152" name="Téglalap: lekerekített 151">
+                <a:extLst>
+                  <a:ext uri="{FF2B5EF4-FFF2-40B4-BE49-F238E27FC236}">
+                    <a16:creationId xmlns:a16="http://schemas.microsoft.com/office/drawing/2014/main" id="{7D957B5C-B306-46D7-97D9-FA7E9A59BBC1}"/>
+                  </a:ext>
+                </a:extLst>
+              </p:cNvPr>
+              <p:cNvSpPr/>
+              <p:nvPr/>
+            </p:nvSpPr>
+            <p:spPr>
+              <a:xfrm>
+                <a:off x="5006695" y="144433"/>
+                <a:ext cx="2727605" cy="581953"/>
+              </a:xfrm>
+              <a:prstGeom prst="roundRect">
+                <a:avLst/>
+              </a:prstGeom>
+              <a:solidFill>
+                <a:schemeClr val="bg1"/>
+              </a:solidFill>
+            </p:spPr>
+            <p:style>
+              <a:lnRef idx="2">
+                <a:schemeClr val="accent1">
+                  <a:shade val="50000"/>
+                </a:schemeClr>
+              </a:lnRef>
+              <a:fillRef idx="1">
+                <a:schemeClr val="accent1"/>
+              </a:fillRef>
+              <a:effectRef idx="0">
+                <a:schemeClr val="accent1"/>
+              </a:effectRef>
+              <a:fontRef idx="minor">
+                <a:schemeClr val="lt1"/>
+              </a:fontRef>
+            </p:style>
+            <p:txBody>
+              <a:bodyPr rtlCol="0" anchor="ctr"/>
+              <a:lstStyle/>
+              <a:p>
+                <a:pPr algn="ctr"/>
+                <a:endParaRPr lang="hu-HU" dirty="0"/>
+              </a:p>
+            </p:txBody>
+          </p:sp>
+          <p:sp>
+            <p:nvSpPr>
+              <p:cNvPr id="153" name="Ellipszis 152">
+                <a:extLst>
+                  <a:ext uri="{FF2B5EF4-FFF2-40B4-BE49-F238E27FC236}">
+                    <a16:creationId xmlns:a16="http://schemas.microsoft.com/office/drawing/2014/main" id="{93091C57-DFE3-43F0-9F62-BC6DE2F13A74}"/>
+                  </a:ext>
+                </a:extLst>
+              </p:cNvPr>
+              <p:cNvSpPr/>
+              <p:nvPr/>
+            </p:nvSpPr>
+            <p:spPr>
+              <a:xfrm>
+                <a:off x="6381593" y="160317"/>
+                <a:ext cx="1330349" cy="543960"/>
+              </a:xfrm>
+              <a:prstGeom prst="ellipse">
+                <a:avLst/>
+              </a:prstGeom>
+            </p:spPr>
+            <p:style>
+              <a:lnRef idx="2">
+                <a:schemeClr val="accent2">
+                  <a:shade val="50000"/>
+                </a:schemeClr>
+              </a:lnRef>
+              <a:fillRef idx="1">
+                <a:schemeClr val="accent2"/>
+              </a:fillRef>
+              <a:effectRef idx="0">
+                <a:schemeClr val="accent2"/>
+              </a:effectRef>
+              <a:fontRef idx="minor">
+                <a:schemeClr val="lt1"/>
+              </a:fontRef>
+            </p:style>
+            <p:txBody>
+              <a:bodyPr rtlCol="0" anchor="ctr"/>
+              <a:lstStyle/>
+              <a:p>
+                <a:pPr algn="ctr"/>
+                <a:r>
+                  <a:rPr lang="hu-HU" dirty="0"/>
+                  <a:t>Oper.</a:t>
+                </a:r>
+              </a:p>
+            </p:txBody>
+          </p:sp>
+          <p:sp>
+            <p:nvSpPr>
+              <p:cNvPr id="154" name="Ellipszis 153">
+                <a:extLst>
+                  <a:ext uri="{FF2B5EF4-FFF2-40B4-BE49-F238E27FC236}">
+                    <a16:creationId xmlns:a16="http://schemas.microsoft.com/office/drawing/2014/main" id="{1F261588-3F8F-4B38-9935-3871C1970ED0}"/>
+                  </a:ext>
+                </a:extLst>
+              </p:cNvPr>
+              <p:cNvSpPr/>
+              <p:nvPr/>
+            </p:nvSpPr>
+            <p:spPr>
+              <a:xfrm>
+                <a:off x="5029574" y="149743"/>
+                <a:ext cx="1330349" cy="543960"/>
+              </a:xfrm>
+              <a:prstGeom prst="ellipse">
+                <a:avLst/>
+              </a:prstGeom>
+            </p:spPr>
+            <p:style>
+              <a:lnRef idx="2">
+                <a:schemeClr val="accent5">
+                  <a:shade val="50000"/>
+                </a:schemeClr>
+              </a:lnRef>
+              <a:fillRef idx="1">
+                <a:schemeClr val="accent5"/>
+              </a:fillRef>
+              <a:effectRef idx="0">
+                <a:schemeClr val="accent5"/>
+              </a:effectRef>
+              <a:fontRef idx="minor">
+                <a:schemeClr val="lt1"/>
+              </a:fontRef>
+            </p:style>
+            <p:txBody>
+              <a:bodyPr rtlCol="0" anchor="ctr"/>
+              <a:lstStyle/>
+              <a:p>
+                <a:pPr algn="ctr"/>
+                <a:r>
+                  <a:rPr lang="hu-HU" dirty="0"/>
+                  <a:t>Maint.</a:t>
+                </a:r>
+              </a:p>
+            </p:txBody>
+          </p:sp>
+          <p:sp>
+            <p:nvSpPr>
+              <p:cNvPr id="155" name="Téglalap: lekerekített 154">
+                <a:extLst>
+                  <a:ext uri="{FF2B5EF4-FFF2-40B4-BE49-F238E27FC236}">
+                    <a16:creationId xmlns:a16="http://schemas.microsoft.com/office/drawing/2014/main" id="{92B377B7-6518-408C-ACE2-83828A7EA6C7}"/>
+                  </a:ext>
+                </a:extLst>
+              </p:cNvPr>
+              <p:cNvSpPr/>
+              <p:nvPr/>
+            </p:nvSpPr>
+            <p:spPr>
+              <a:xfrm>
+                <a:off x="7837021" y="153676"/>
+                <a:ext cx="2727605" cy="581953"/>
+              </a:xfrm>
+              <a:prstGeom prst="roundRect">
+                <a:avLst/>
+              </a:prstGeom>
+              <a:solidFill>
+                <a:schemeClr val="bg1"/>
+              </a:solidFill>
+            </p:spPr>
+            <p:style>
+              <a:lnRef idx="2">
+                <a:schemeClr val="accent1">
+                  <a:shade val="50000"/>
+                </a:schemeClr>
+              </a:lnRef>
+              <a:fillRef idx="1">
+                <a:schemeClr val="accent1"/>
+              </a:fillRef>
+              <a:effectRef idx="0">
+                <a:schemeClr val="accent1"/>
+              </a:effectRef>
+              <a:fontRef idx="minor">
+                <a:schemeClr val="lt1"/>
+              </a:fontRef>
+            </p:style>
+            <p:txBody>
+              <a:bodyPr rtlCol="0" anchor="ctr"/>
+              <a:lstStyle/>
+              <a:p>
+                <a:pPr algn="ctr"/>
+                <a:endParaRPr lang="hu-HU" dirty="0"/>
+              </a:p>
+            </p:txBody>
+          </p:sp>
+          <p:sp>
+            <p:nvSpPr>
+              <p:cNvPr id="156" name="Ellipszis 155">
+                <a:extLst>
+                  <a:ext uri="{FF2B5EF4-FFF2-40B4-BE49-F238E27FC236}">
+                    <a16:creationId xmlns:a16="http://schemas.microsoft.com/office/drawing/2014/main" id="{E0983927-C52F-4AD9-8E9C-5CC7C76350E0}"/>
+                  </a:ext>
+                </a:extLst>
+              </p:cNvPr>
+              <p:cNvSpPr/>
+              <p:nvPr/>
+            </p:nvSpPr>
+            <p:spPr>
+              <a:xfrm>
+                <a:off x="7865619" y="163430"/>
+                <a:ext cx="1330349" cy="543960"/>
+              </a:xfrm>
+              <a:prstGeom prst="ellipse">
+                <a:avLst/>
+              </a:prstGeom>
+            </p:spPr>
+            <p:style>
+              <a:lnRef idx="2">
+                <a:schemeClr val="accent2">
+                  <a:shade val="50000"/>
+                </a:schemeClr>
+              </a:lnRef>
+              <a:fillRef idx="1">
+                <a:schemeClr val="accent2"/>
+              </a:fillRef>
+              <a:effectRef idx="0">
+                <a:schemeClr val="accent2"/>
+              </a:effectRef>
+              <a:fontRef idx="minor">
+                <a:schemeClr val="lt1"/>
+              </a:fontRef>
+            </p:style>
+            <p:txBody>
+              <a:bodyPr rtlCol="0" anchor="ctr"/>
+              <a:lstStyle/>
+              <a:p>
+                <a:pPr algn="ctr"/>
+                <a:r>
+                  <a:rPr lang="hu-HU" dirty="0"/>
+                  <a:t>Idle</a:t>
+                </a:r>
+              </a:p>
+            </p:txBody>
+          </p:sp>
+          <p:sp>
+            <p:nvSpPr>
+              <p:cNvPr id="157" name="Ellipszis 156">
+                <a:extLst>
+                  <a:ext uri="{FF2B5EF4-FFF2-40B4-BE49-F238E27FC236}">
+                    <a16:creationId xmlns:a16="http://schemas.microsoft.com/office/drawing/2014/main" id="{8B411B54-142E-49D3-9512-3D1AD2D9D085}"/>
+                  </a:ext>
+                </a:extLst>
+              </p:cNvPr>
+              <p:cNvSpPr/>
+              <p:nvPr/>
+            </p:nvSpPr>
+            <p:spPr>
+              <a:xfrm>
+                <a:off x="9217638" y="174707"/>
+                <a:ext cx="1330349" cy="543960"/>
+              </a:xfrm>
+              <a:prstGeom prst="ellipse">
+                <a:avLst/>
+              </a:prstGeom>
+            </p:spPr>
+            <p:style>
+              <a:lnRef idx="2">
+                <a:schemeClr val="accent5">
+                  <a:shade val="50000"/>
+                </a:schemeClr>
+              </a:lnRef>
+              <a:fillRef idx="1">
+                <a:schemeClr val="accent5"/>
+              </a:fillRef>
+              <a:effectRef idx="0">
+                <a:schemeClr val="accent5"/>
+              </a:effectRef>
+              <a:fontRef idx="minor">
+                <a:schemeClr val="lt1"/>
+              </a:fontRef>
+            </p:style>
+            <p:txBody>
+              <a:bodyPr rtlCol="0" anchor="ctr"/>
+              <a:lstStyle/>
+              <a:p>
+                <a:pPr algn="ctr"/>
+                <a:r>
+                  <a:rPr lang="hu-HU" dirty="0"/>
+                  <a:t>Proc.</a:t>
+                </a:r>
+              </a:p>
+            </p:txBody>
+          </p:sp>
+        </p:grpSp>
+        <p:sp>
+          <p:nvSpPr>
+            <p:cNvPr id="150" name="Szövegdoboz 149">
+              <a:extLst>
+                <a:ext uri="{FF2B5EF4-FFF2-40B4-BE49-F238E27FC236}">
+                  <a16:creationId xmlns:a16="http://schemas.microsoft.com/office/drawing/2014/main" id="{CC5882F2-DE8F-46B2-8C79-69DC2323D323}"/>
+                </a:ext>
+              </a:extLst>
+            </p:cNvPr>
+            <p:cNvSpPr txBox="1"/>
+            <p:nvPr/>
+          </p:nvSpPr>
+          <p:spPr>
+            <a:xfrm>
+              <a:off x="3931310" y="101483"/>
+              <a:ext cx="980984" cy="369332"/>
+            </a:xfrm>
+            <a:prstGeom prst="rect">
+              <a:avLst/>
+            </a:prstGeom>
+            <a:noFill/>
+          </p:spPr>
+          <p:txBody>
+            <a:bodyPr wrap="square" rtlCol="0">
+              <a:spAutoFit/>
+            </a:bodyPr>
+            <a:lstStyle/>
+            <a:p>
+              <a:r>
+                <a:rPr lang="hu-HU" dirty="0">
+                  <a:solidFill>
+                    <a:schemeClr val="bg1"/>
+                  </a:solidFill>
+                </a:rPr>
+                <a:t>Active</a:t>
+              </a:r>
+            </a:p>
+          </p:txBody>
+        </p:sp>
+      </p:grpSp>
+      <p:grpSp>
+        <p:nvGrpSpPr>
+          <p:cNvPr id="158" name="Csoportba foglalás 157">
+            <a:extLst>
+              <a:ext uri="{FF2B5EF4-FFF2-40B4-BE49-F238E27FC236}">
+                <a16:creationId xmlns:a16="http://schemas.microsoft.com/office/drawing/2014/main" id="{615B360A-DF44-4B7B-9305-F2351F45637C}"/>
+              </a:ext>
+            </a:extLst>
+          </p:cNvPr>
+          <p:cNvGrpSpPr/>
+          <p:nvPr/>
+        </p:nvGrpSpPr>
+        <p:grpSpPr>
+          <a:xfrm>
+            <a:off x="3851797" y="4111265"/>
+            <a:ext cx="6664105" cy="666391"/>
+            <a:chOff x="3922990" y="101483"/>
+            <a:chExt cx="6664105" cy="666391"/>
+          </a:xfrm>
+        </p:grpSpPr>
+        <p:grpSp>
+          <p:nvGrpSpPr>
+            <p:cNvPr id="159" name="Csoportba foglalás 158">
+              <a:extLst>
+                <a:ext uri="{FF2B5EF4-FFF2-40B4-BE49-F238E27FC236}">
+                  <a16:creationId xmlns:a16="http://schemas.microsoft.com/office/drawing/2014/main" id="{3E507869-0F8A-4CA9-9D44-3BDBFDE1C2E2}"/>
+                </a:ext>
+              </a:extLst>
+            </p:cNvPr>
+            <p:cNvGrpSpPr/>
+            <p:nvPr/>
+          </p:nvGrpSpPr>
+          <p:grpSpPr>
+            <a:xfrm>
+              <a:off x="3922990" y="111042"/>
+              <a:ext cx="6664105" cy="656832"/>
+              <a:chOff x="3922990" y="111042"/>
+              <a:chExt cx="6664105" cy="656832"/>
+            </a:xfrm>
+          </p:grpSpPr>
+          <p:sp>
+            <p:nvSpPr>
+              <p:cNvPr id="161" name="Téglalap: lekerekített 160">
+                <a:extLst>
+                  <a:ext uri="{FF2B5EF4-FFF2-40B4-BE49-F238E27FC236}">
+                    <a16:creationId xmlns:a16="http://schemas.microsoft.com/office/drawing/2014/main" id="{EEE8B990-C49A-4102-BF1F-3AC6E2F9110C}"/>
+                  </a:ext>
+                </a:extLst>
+              </p:cNvPr>
+              <p:cNvSpPr/>
+              <p:nvPr/>
+            </p:nvSpPr>
+            <p:spPr>
+              <a:xfrm>
+                <a:off x="3922990" y="111042"/>
+                <a:ext cx="6664105" cy="656832"/>
+              </a:xfrm>
+              <a:prstGeom prst="roundRect">
+                <a:avLst/>
+              </a:prstGeom>
+            </p:spPr>
+            <p:style>
+              <a:lnRef idx="2">
+                <a:schemeClr val="accent2">
+                  <a:shade val="50000"/>
+                </a:schemeClr>
+              </a:lnRef>
+              <a:fillRef idx="1">
+                <a:schemeClr val="accent2"/>
+              </a:fillRef>
+              <a:effectRef idx="0">
+                <a:schemeClr val="accent2"/>
+              </a:effectRef>
+              <a:fontRef idx="minor">
+                <a:schemeClr val="lt1"/>
+              </a:fontRef>
+            </p:style>
+            <p:txBody>
+              <a:bodyPr rtlCol="0" anchor="ctr"/>
+              <a:lstStyle/>
+              <a:p>
+                <a:pPr algn="ctr"/>
+                <a:endParaRPr lang="hu-HU" dirty="0"/>
+              </a:p>
+            </p:txBody>
+          </p:sp>
+          <p:sp>
+            <p:nvSpPr>
+              <p:cNvPr id="162" name="Téglalap: lekerekített 161">
+                <a:extLst>
+                  <a:ext uri="{FF2B5EF4-FFF2-40B4-BE49-F238E27FC236}">
+                    <a16:creationId xmlns:a16="http://schemas.microsoft.com/office/drawing/2014/main" id="{22499DDF-AC83-453A-806A-3D0A8F40FCC4}"/>
+                  </a:ext>
+                </a:extLst>
+              </p:cNvPr>
+              <p:cNvSpPr/>
+              <p:nvPr/>
+            </p:nvSpPr>
+            <p:spPr>
+              <a:xfrm>
+                <a:off x="5006695" y="144433"/>
+                <a:ext cx="2727605" cy="581953"/>
+              </a:xfrm>
+              <a:prstGeom prst="roundRect">
+                <a:avLst/>
+              </a:prstGeom>
+              <a:solidFill>
+                <a:schemeClr val="bg1"/>
+              </a:solidFill>
+            </p:spPr>
+            <p:style>
+              <a:lnRef idx="2">
+                <a:schemeClr val="accent1">
+                  <a:shade val="50000"/>
+                </a:schemeClr>
+              </a:lnRef>
+              <a:fillRef idx="1">
+                <a:schemeClr val="accent1"/>
+              </a:fillRef>
+              <a:effectRef idx="0">
+                <a:schemeClr val="accent1"/>
+              </a:effectRef>
+              <a:fontRef idx="minor">
+                <a:schemeClr val="lt1"/>
+              </a:fontRef>
+            </p:style>
+            <p:txBody>
+              <a:bodyPr rtlCol="0" anchor="ctr"/>
+              <a:lstStyle/>
+              <a:p>
+                <a:pPr algn="ctr"/>
+                <a:endParaRPr lang="hu-HU" dirty="0"/>
+              </a:p>
+            </p:txBody>
+          </p:sp>
+          <p:sp>
+            <p:nvSpPr>
+              <p:cNvPr id="163" name="Ellipszis 162">
+                <a:extLst>
+                  <a:ext uri="{FF2B5EF4-FFF2-40B4-BE49-F238E27FC236}">
+                    <a16:creationId xmlns:a16="http://schemas.microsoft.com/office/drawing/2014/main" id="{51165CAA-2C61-4B20-8585-615EEDC16542}"/>
+                  </a:ext>
+                </a:extLst>
+              </p:cNvPr>
+              <p:cNvSpPr/>
+              <p:nvPr/>
+            </p:nvSpPr>
+            <p:spPr>
+              <a:xfrm>
+                <a:off x="6381593" y="160317"/>
+                <a:ext cx="1330349" cy="543960"/>
+              </a:xfrm>
+              <a:prstGeom prst="ellipse">
+                <a:avLst/>
+              </a:prstGeom>
+            </p:spPr>
+            <p:style>
+              <a:lnRef idx="2">
+                <a:schemeClr val="accent2">
+                  <a:shade val="50000"/>
+                </a:schemeClr>
+              </a:lnRef>
+              <a:fillRef idx="1">
+                <a:schemeClr val="accent2"/>
+              </a:fillRef>
+              <a:effectRef idx="0">
+                <a:schemeClr val="accent2"/>
+              </a:effectRef>
+              <a:fontRef idx="minor">
+                <a:schemeClr val="lt1"/>
+              </a:fontRef>
+            </p:style>
+            <p:txBody>
+              <a:bodyPr rtlCol="0" anchor="ctr"/>
+              <a:lstStyle/>
+              <a:p>
+                <a:pPr algn="ctr"/>
+                <a:r>
+                  <a:rPr lang="hu-HU" dirty="0"/>
+                  <a:t>Oper.</a:t>
+                </a:r>
+              </a:p>
+            </p:txBody>
+          </p:sp>
+          <p:sp>
+            <p:nvSpPr>
+              <p:cNvPr id="164" name="Ellipszis 163">
+                <a:extLst>
+                  <a:ext uri="{FF2B5EF4-FFF2-40B4-BE49-F238E27FC236}">
+                    <a16:creationId xmlns:a16="http://schemas.microsoft.com/office/drawing/2014/main" id="{00C8F8C0-D6BE-4C70-A00B-5EB387341A2A}"/>
+                  </a:ext>
+                </a:extLst>
+              </p:cNvPr>
+              <p:cNvSpPr/>
+              <p:nvPr/>
+            </p:nvSpPr>
+            <p:spPr>
+              <a:xfrm>
+                <a:off x="5029574" y="149743"/>
+                <a:ext cx="1330349" cy="543960"/>
+              </a:xfrm>
+              <a:prstGeom prst="ellipse">
+                <a:avLst/>
+              </a:prstGeom>
+            </p:spPr>
+            <p:style>
+              <a:lnRef idx="2">
+                <a:schemeClr val="accent5">
+                  <a:shade val="50000"/>
+                </a:schemeClr>
+              </a:lnRef>
+              <a:fillRef idx="1">
+                <a:schemeClr val="accent5"/>
+              </a:fillRef>
+              <a:effectRef idx="0">
+                <a:schemeClr val="accent5"/>
+              </a:effectRef>
+              <a:fontRef idx="minor">
+                <a:schemeClr val="lt1"/>
+              </a:fontRef>
+            </p:style>
+            <p:txBody>
+              <a:bodyPr rtlCol="0" anchor="ctr"/>
+              <a:lstStyle/>
+              <a:p>
+                <a:pPr algn="ctr"/>
+                <a:r>
+                  <a:rPr lang="hu-HU" dirty="0"/>
+                  <a:t>Maint.</a:t>
+                </a:r>
+              </a:p>
+            </p:txBody>
+          </p:sp>
+          <p:sp>
+            <p:nvSpPr>
+              <p:cNvPr id="165" name="Téglalap: lekerekített 164">
+                <a:extLst>
+                  <a:ext uri="{FF2B5EF4-FFF2-40B4-BE49-F238E27FC236}">
+                    <a16:creationId xmlns:a16="http://schemas.microsoft.com/office/drawing/2014/main" id="{428E6060-8A08-4659-9C31-F451D3348683}"/>
+                  </a:ext>
+                </a:extLst>
+              </p:cNvPr>
+              <p:cNvSpPr/>
+              <p:nvPr/>
+            </p:nvSpPr>
+            <p:spPr>
+              <a:xfrm>
+                <a:off x="7837021" y="153676"/>
+                <a:ext cx="2727605" cy="581953"/>
+              </a:xfrm>
+              <a:prstGeom prst="roundRect">
+                <a:avLst/>
+              </a:prstGeom>
+              <a:solidFill>
+                <a:schemeClr val="bg1"/>
+              </a:solidFill>
+            </p:spPr>
+            <p:style>
+              <a:lnRef idx="2">
+                <a:schemeClr val="accent1">
+                  <a:shade val="50000"/>
+                </a:schemeClr>
+              </a:lnRef>
+              <a:fillRef idx="1">
+                <a:schemeClr val="accent1"/>
+              </a:fillRef>
+              <a:effectRef idx="0">
+                <a:schemeClr val="accent1"/>
+              </a:effectRef>
+              <a:fontRef idx="minor">
+                <a:schemeClr val="lt1"/>
+              </a:fontRef>
+            </p:style>
+            <p:txBody>
+              <a:bodyPr rtlCol="0" anchor="ctr"/>
+              <a:lstStyle/>
+              <a:p>
+                <a:pPr algn="ctr"/>
+                <a:endParaRPr lang="hu-HU" dirty="0"/>
+              </a:p>
+            </p:txBody>
+          </p:sp>
+          <p:sp>
+            <p:nvSpPr>
+              <p:cNvPr id="166" name="Ellipszis 165">
+                <a:extLst>
+                  <a:ext uri="{FF2B5EF4-FFF2-40B4-BE49-F238E27FC236}">
+                    <a16:creationId xmlns:a16="http://schemas.microsoft.com/office/drawing/2014/main" id="{B2F64FCF-7886-4EF5-9F9A-641A48501727}"/>
+                  </a:ext>
+                </a:extLst>
+              </p:cNvPr>
+              <p:cNvSpPr/>
+              <p:nvPr/>
+            </p:nvSpPr>
+            <p:spPr>
+              <a:xfrm>
+                <a:off x="7865619" y="163430"/>
+                <a:ext cx="1330349" cy="543960"/>
+              </a:xfrm>
+              <a:prstGeom prst="ellipse">
+                <a:avLst/>
+              </a:prstGeom>
+            </p:spPr>
+            <p:style>
+              <a:lnRef idx="2">
+                <a:schemeClr val="accent5">
+                  <a:shade val="50000"/>
+                </a:schemeClr>
+              </a:lnRef>
+              <a:fillRef idx="1">
+                <a:schemeClr val="accent5"/>
+              </a:fillRef>
+              <a:effectRef idx="0">
+                <a:schemeClr val="accent5"/>
+              </a:effectRef>
+              <a:fontRef idx="minor">
+                <a:schemeClr val="lt1"/>
+              </a:fontRef>
+            </p:style>
+            <p:txBody>
+              <a:bodyPr rtlCol="0" anchor="ctr"/>
+              <a:lstStyle/>
+              <a:p>
+                <a:pPr algn="ctr"/>
+                <a:r>
+                  <a:rPr lang="hu-HU" dirty="0"/>
+                  <a:t>Idle</a:t>
+                </a:r>
+              </a:p>
+            </p:txBody>
+          </p:sp>
+          <p:sp>
+            <p:nvSpPr>
+              <p:cNvPr id="167" name="Ellipszis 166">
+                <a:extLst>
+                  <a:ext uri="{FF2B5EF4-FFF2-40B4-BE49-F238E27FC236}">
+                    <a16:creationId xmlns:a16="http://schemas.microsoft.com/office/drawing/2014/main" id="{9B6A515D-5ECD-4BB0-A524-E3B4E65090F7}"/>
+                  </a:ext>
+                </a:extLst>
+              </p:cNvPr>
+              <p:cNvSpPr/>
+              <p:nvPr/>
+            </p:nvSpPr>
+            <p:spPr>
+              <a:xfrm>
+                <a:off x="9217638" y="174707"/>
+                <a:ext cx="1330349" cy="543960"/>
+              </a:xfrm>
+              <a:prstGeom prst="ellipse">
+                <a:avLst/>
+              </a:prstGeom>
+            </p:spPr>
+            <p:style>
+              <a:lnRef idx="2">
+                <a:schemeClr val="accent2">
+                  <a:shade val="50000"/>
+                </a:schemeClr>
+              </a:lnRef>
+              <a:fillRef idx="1">
+                <a:schemeClr val="accent2"/>
+              </a:fillRef>
+              <a:effectRef idx="0">
+                <a:schemeClr val="accent2"/>
+              </a:effectRef>
+              <a:fontRef idx="minor">
+                <a:schemeClr val="lt1"/>
+              </a:fontRef>
+            </p:style>
+            <p:txBody>
+              <a:bodyPr rtlCol="0" anchor="ctr"/>
+              <a:lstStyle/>
+              <a:p>
+                <a:pPr algn="ctr"/>
+                <a:r>
+                  <a:rPr lang="hu-HU" dirty="0"/>
+                  <a:t>Proc.</a:t>
+                </a:r>
+              </a:p>
+            </p:txBody>
+          </p:sp>
+        </p:grpSp>
+        <p:sp>
+          <p:nvSpPr>
+            <p:cNvPr id="160" name="Szövegdoboz 159">
+              <a:extLst>
+                <a:ext uri="{FF2B5EF4-FFF2-40B4-BE49-F238E27FC236}">
+                  <a16:creationId xmlns:a16="http://schemas.microsoft.com/office/drawing/2014/main" id="{760D11B8-3DBB-4FBE-A298-851F74A4C7CD}"/>
+                </a:ext>
+              </a:extLst>
+            </p:cNvPr>
+            <p:cNvSpPr txBox="1"/>
+            <p:nvPr/>
+          </p:nvSpPr>
+          <p:spPr>
+            <a:xfrm>
+              <a:off x="3931310" y="101483"/>
+              <a:ext cx="980984" cy="369332"/>
+            </a:xfrm>
+            <a:prstGeom prst="rect">
+              <a:avLst/>
+            </a:prstGeom>
+            <a:noFill/>
+          </p:spPr>
+          <p:txBody>
+            <a:bodyPr wrap="square" rtlCol="0">
+              <a:spAutoFit/>
+            </a:bodyPr>
+            <a:lstStyle/>
+            <a:p>
+              <a:r>
+                <a:rPr lang="hu-HU" dirty="0">
+                  <a:solidFill>
+                    <a:schemeClr val="bg1"/>
+                  </a:solidFill>
+                </a:rPr>
+                <a:t>Active</a:t>
+              </a:r>
+            </a:p>
+          </p:txBody>
+        </p:sp>
+      </p:grpSp>
+      <p:grpSp>
+        <p:nvGrpSpPr>
+          <p:cNvPr id="168" name="Csoportba foglalás 167">
+            <a:extLst>
+              <a:ext uri="{FF2B5EF4-FFF2-40B4-BE49-F238E27FC236}">
+                <a16:creationId xmlns:a16="http://schemas.microsoft.com/office/drawing/2014/main" id="{892814E3-45EB-442B-9C2E-E39C56B46A66}"/>
+              </a:ext>
+            </a:extLst>
+          </p:cNvPr>
+          <p:cNvGrpSpPr/>
+          <p:nvPr/>
+        </p:nvGrpSpPr>
+        <p:grpSpPr>
+          <a:xfrm>
+            <a:off x="3851797" y="5425072"/>
+            <a:ext cx="6664105" cy="666391"/>
+            <a:chOff x="3922990" y="101483"/>
+            <a:chExt cx="6664105" cy="666391"/>
+          </a:xfrm>
+        </p:grpSpPr>
+        <p:grpSp>
+          <p:nvGrpSpPr>
+            <p:cNvPr id="169" name="Csoportba foglalás 168">
+              <a:extLst>
+                <a:ext uri="{FF2B5EF4-FFF2-40B4-BE49-F238E27FC236}">
+                  <a16:creationId xmlns:a16="http://schemas.microsoft.com/office/drawing/2014/main" id="{AD361403-30A3-450F-BF32-BCD964FF89BA}"/>
+                </a:ext>
+              </a:extLst>
+            </p:cNvPr>
+            <p:cNvGrpSpPr/>
+            <p:nvPr/>
+          </p:nvGrpSpPr>
+          <p:grpSpPr>
+            <a:xfrm>
+              <a:off x="3922990" y="111042"/>
+              <a:ext cx="6664105" cy="656832"/>
+              <a:chOff x="3922990" y="111042"/>
+              <a:chExt cx="6664105" cy="656832"/>
+            </a:xfrm>
+          </p:grpSpPr>
+          <p:sp>
+            <p:nvSpPr>
+              <p:cNvPr id="171" name="Téglalap: lekerekített 170">
+                <a:extLst>
+                  <a:ext uri="{FF2B5EF4-FFF2-40B4-BE49-F238E27FC236}">
+                    <a16:creationId xmlns:a16="http://schemas.microsoft.com/office/drawing/2014/main" id="{806662D2-3CA4-4ECD-BCB2-76F4963559A7}"/>
+                  </a:ext>
+                </a:extLst>
+              </p:cNvPr>
+              <p:cNvSpPr/>
+              <p:nvPr/>
+            </p:nvSpPr>
+            <p:spPr>
+              <a:xfrm>
+                <a:off x="3922990" y="111042"/>
+                <a:ext cx="6664105" cy="656832"/>
+              </a:xfrm>
+              <a:prstGeom prst="roundRect">
+                <a:avLst/>
+              </a:prstGeom>
+            </p:spPr>
+            <p:style>
+              <a:lnRef idx="2">
+                <a:schemeClr val="accent2">
+                  <a:shade val="50000"/>
+                </a:schemeClr>
+              </a:lnRef>
+              <a:fillRef idx="1">
+                <a:schemeClr val="accent2"/>
+              </a:fillRef>
+              <a:effectRef idx="0">
+                <a:schemeClr val="accent2"/>
+              </a:effectRef>
+              <a:fontRef idx="minor">
+                <a:schemeClr val="lt1"/>
+              </a:fontRef>
+            </p:style>
+            <p:txBody>
+              <a:bodyPr rtlCol="0" anchor="ctr"/>
+              <a:lstStyle/>
+              <a:p>
+                <a:pPr algn="ctr"/>
+                <a:endParaRPr lang="hu-HU" dirty="0"/>
+              </a:p>
+            </p:txBody>
+          </p:sp>
+          <p:sp>
+            <p:nvSpPr>
+              <p:cNvPr id="172" name="Téglalap: lekerekített 171">
+                <a:extLst>
+                  <a:ext uri="{FF2B5EF4-FFF2-40B4-BE49-F238E27FC236}">
+                    <a16:creationId xmlns:a16="http://schemas.microsoft.com/office/drawing/2014/main" id="{4D08C0D5-13AD-4765-A599-C4F45DAADECB}"/>
+                  </a:ext>
+                </a:extLst>
+              </p:cNvPr>
+              <p:cNvSpPr/>
+              <p:nvPr/>
+            </p:nvSpPr>
+            <p:spPr>
+              <a:xfrm>
+                <a:off x="5006695" y="144433"/>
+                <a:ext cx="2727605" cy="581953"/>
+              </a:xfrm>
+              <a:prstGeom prst="roundRect">
+                <a:avLst/>
+              </a:prstGeom>
+              <a:solidFill>
+                <a:schemeClr val="bg1"/>
+              </a:solidFill>
+            </p:spPr>
+            <p:style>
+              <a:lnRef idx="2">
+                <a:schemeClr val="accent1">
+                  <a:shade val="50000"/>
+                </a:schemeClr>
+              </a:lnRef>
+              <a:fillRef idx="1">
+                <a:schemeClr val="accent1"/>
+              </a:fillRef>
+              <a:effectRef idx="0">
+                <a:schemeClr val="accent1"/>
+              </a:effectRef>
+              <a:fontRef idx="minor">
+                <a:schemeClr val="lt1"/>
+              </a:fontRef>
+            </p:style>
+            <p:txBody>
+              <a:bodyPr rtlCol="0" anchor="ctr"/>
+              <a:lstStyle/>
+              <a:p>
+                <a:pPr algn="ctr"/>
+                <a:endParaRPr lang="hu-HU" dirty="0"/>
+              </a:p>
+            </p:txBody>
+          </p:sp>
+          <p:sp>
+            <p:nvSpPr>
+              <p:cNvPr id="173" name="Ellipszis 172">
+                <a:extLst>
+                  <a:ext uri="{FF2B5EF4-FFF2-40B4-BE49-F238E27FC236}">
+                    <a16:creationId xmlns:a16="http://schemas.microsoft.com/office/drawing/2014/main" id="{F5456BB2-C224-4961-92F9-528F55918534}"/>
+                  </a:ext>
+                </a:extLst>
+              </p:cNvPr>
+              <p:cNvSpPr/>
+              <p:nvPr/>
+            </p:nvSpPr>
+            <p:spPr>
+              <a:xfrm>
+                <a:off x="6381593" y="160317"/>
+                <a:ext cx="1330349" cy="543960"/>
+              </a:xfrm>
+              <a:prstGeom prst="ellipse">
+                <a:avLst/>
+              </a:prstGeom>
+            </p:spPr>
+            <p:style>
+              <a:lnRef idx="2">
+                <a:schemeClr val="accent5">
+                  <a:shade val="50000"/>
+                </a:schemeClr>
+              </a:lnRef>
+              <a:fillRef idx="1">
+                <a:schemeClr val="accent5"/>
+              </a:fillRef>
+              <a:effectRef idx="0">
+                <a:schemeClr val="accent5"/>
+              </a:effectRef>
+              <a:fontRef idx="minor">
+                <a:schemeClr val="lt1"/>
+              </a:fontRef>
+            </p:style>
+            <p:txBody>
+              <a:bodyPr rtlCol="0" anchor="ctr"/>
+              <a:lstStyle/>
+              <a:p>
+                <a:pPr algn="ctr"/>
+                <a:r>
+                  <a:rPr lang="hu-HU" dirty="0"/>
+                  <a:t>Oper.</a:t>
+                </a:r>
+              </a:p>
+            </p:txBody>
+          </p:sp>
+          <p:sp>
+            <p:nvSpPr>
+              <p:cNvPr id="174" name="Ellipszis 173">
+                <a:extLst>
+                  <a:ext uri="{FF2B5EF4-FFF2-40B4-BE49-F238E27FC236}">
+                    <a16:creationId xmlns:a16="http://schemas.microsoft.com/office/drawing/2014/main" id="{00BBCC27-C8D3-41A0-98BA-8DA23BE2D14D}"/>
+                  </a:ext>
+                </a:extLst>
+              </p:cNvPr>
+              <p:cNvSpPr/>
+              <p:nvPr/>
+            </p:nvSpPr>
+            <p:spPr>
+              <a:xfrm>
+                <a:off x="5029574" y="149743"/>
+                <a:ext cx="1330349" cy="543960"/>
+              </a:xfrm>
+              <a:prstGeom prst="ellipse">
+                <a:avLst/>
+              </a:prstGeom>
+              <a:ln w="57150">
+                <a:solidFill>
+                  <a:srgbClr val="FF0000"/>
+                </a:solidFill>
+              </a:ln>
+            </p:spPr>
+            <p:style>
+              <a:lnRef idx="2">
+                <a:schemeClr val="accent2">
+                  <a:shade val="50000"/>
+                </a:schemeClr>
+              </a:lnRef>
+              <a:fillRef idx="1">
+                <a:schemeClr val="accent2"/>
+              </a:fillRef>
+              <a:effectRef idx="0">
+                <a:schemeClr val="accent2"/>
+              </a:effectRef>
+              <a:fontRef idx="minor">
+                <a:schemeClr val="lt1"/>
+              </a:fontRef>
+            </p:style>
+            <p:txBody>
+              <a:bodyPr rtlCol="0" anchor="ctr"/>
+              <a:lstStyle/>
+              <a:p>
+                <a:pPr algn="ctr"/>
+                <a:r>
+                  <a:rPr lang="hu-HU" dirty="0"/>
+                  <a:t>Maint.</a:t>
+                </a:r>
+              </a:p>
+            </p:txBody>
+          </p:sp>
+          <p:sp>
+            <p:nvSpPr>
+              <p:cNvPr id="175" name="Téglalap: lekerekített 174">
+                <a:extLst>
+                  <a:ext uri="{FF2B5EF4-FFF2-40B4-BE49-F238E27FC236}">
+                    <a16:creationId xmlns:a16="http://schemas.microsoft.com/office/drawing/2014/main" id="{0D5B8431-BEAD-4B81-B526-D8BC9E316006}"/>
+                  </a:ext>
+                </a:extLst>
+              </p:cNvPr>
+              <p:cNvSpPr/>
+              <p:nvPr/>
+            </p:nvSpPr>
+            <p:spPr>
+              <a:xfrm>
+                <a:off x="7837021" y="153676"/>
+                <a:ext cx="2727605" cy="581953"/>
+              </a:xfrm>
+              <a:prstGeom prst="roundRect">
+                <a:avLst/>
+              </a:prstGeom>
+              <a:solidFill>
+                <a:schemeClr val="bg1"/>
+              </a:solidFill>
+            </p:spPr>
+            <p:style>
+              <a:lnRef idx="2">
+                <a:schemeClr val="accent1">
+                  <a:shade val="50000"/>
+                </a:schemeClr>
+              </a:lnRef>
+              <a:fillRef idx="1">
+                <a:schemeClr val="accent1"/>
+              </a:fillRef>
+              <a:effectRef idx="0">
+                <a:schemeClr val="accent1"/>
+              </a:effectRef>
+              <a:fontRef idx="minor">
+                <a:schemeClr val="lt1"/>
+              </a:fontRef>
+            </p:style>
+            <p:txBody>
+              <a:bodyPr rtlCol="0" anchor="ctr"/>
+              <a:lstStyle/>
+              <a:p>
+                <a:pPr algn="ctr"/>
+                <a:endParaRPr lang="hu-HU" dirty="0"/>
+              </a:p>
+            </p:txBody>
+          </p:sp>
+          <p:sp>
+            <p:nvSpPr>
+              <p:cNvPr id="176" name="Ellipszis 175">
+                <a:extLst>
+                  <a:ext uri="{FF2B5EF4-FFF2-40B4-BE49-F238E27FC236}">
+                    <a16:creationId xmlns:a16="http://schemas.microsoft.com/office/drawing/2014/main" id="{8D2518DB-D44A-4470-A125-C6C2F2700B3C}"/>
+                  </a:ext>
+                </a:extLst>
+              </p:cNvPr>
+              <p:cNvSpPr/>
+              <p:nvPr/>
+            </p:nvSpPr>
+            <p:spPr>
+              <a:xfrm>
+                <a:off x="7865619" y="163430"/>
+                <a:ext cx="1330349" cy="543960"/>
+              </a:xfrm>
+              <a:prstGeom prst="ellipse">
+                <a:avLst/>
+              </a:prstGeom>
+            </p:spPr>
+            <p:style>
+              <a:lnRef idx="2">
+                <a:schemeClr val="accent5">
+                  <a:shade val="50000"/>
+                </a:schemeClr>
+              </a:lnRef>
+              <a:fillRef idx="1">
+                <a:schemeClr val="accent5"/>
+              </a:fillRef>
+              <a:effectRef idx="0">
+                <a:schemeClr val="accent5"/>
+              </a:effectRef>
+              <a:fontRef idx="minor">
+                <a:schemeClr val="lt1"/>
+              </a:fontRef>
+            </p:style>
+            <p:txBody>
+              <a:bodyPr rtlCol="0" anchor="ctr"/>
+              <a:lstStyle/>
+              <a:p>
+                <a:pPr algn="ctr"/>
+                <a:r>
+                  <a:rPr lang="hu-HU" dirty="0"/>
+                  <a:t>Idle</a:t>
+                </a:r>
+              </a:p>
+            </p:txBody>
+          </p:sp>
+          <p:sp>
+            <p:nvSpPr>
+              <p:cNvPr id="177" name="Ellipszis 176">
+                <a:extLst>
+                  <a:ext uri="{FF2B5EF4-FFF2-40B4-BE49-F238E27FC236}">
+                    <a16:creationId xmlns:a16="http://schemas.microsoft.com/office/drawing/2014/main" id="{6EE975AC-749C-4270-93A5-ACDD76E88CC4}"/>
+                  </a:ext>
+                </a:extLst>
+              </p:cNvPr>
+              <p:cNvSpPr/>
+              <p:nvPr/>
+            </p:nvSpPr>
+            <p:spPr>
+              <a:xfrm>
+                <a:off x="9217638" y="174707"/>
+                <a:ext cx="1330349" cy="543960"/>
+              </a:xfrm>
+              <a:prstGeom prst="ellipse">
+                <a:avLst/>
+              </a:prstGeom>
+              <a:ln w="57150">
+                <a:solidFill>
+                  <a:srgbClr val="FF0000"/>
+                </a:solidFill>
+              </a:ln>
+            </p:spPr>
+            <p:style>
+              <a:lnRef idx="2">
+                <a:schemeClr val="accent2">
+                  <a:shade val="50000"/>
+                </a:schemeClr>
+              </a:lnRef>
+              <a:fillRef idx="1">
+                <a:schemeClr val="accent2"/>
+              </a:fillRef>
+              <a:effectRef idx="0">
+                <a:schemeClr val="accent2"/>
+              </a:effectRef>
+              <a:fontRef idx="minor">
+                <a:schemeClr val="lt1"/>
+              </a:fontRef>
+            </p:style>
+            <p:txBody>
+              <a:bodyPr rtlCol="0" anchor="ctr"/>
+              <a:lstStyle/>
+              <a:p>
+                <a:pPr algn="ctr"/>
+                <a:r>
+                  <a:rPr lang="hu-HU" dirty="0"/>
+                  <a:t>Proc.</a:t>
+                </a:r>
+              </a:p>
+            </p:txBody>
+          </p:sp>
+        </p:grpSp>
+        <p:sp>
+          <p:nvSpPr>
+            <p:cNvPr id="170" name="Szövegdoboz 169">
+              <a:extLst>
+                <a:ext uri="{FF2B5EF4-FFF2-40B4-BE49-F238E27FC236}">
+                  <a16:creationId xmlns:a16="http://schemas.microsoft.com/office/drawing/2014/main" id="{73F6D8C2-2CE4-4EE7-871F-D2F41D291CF3}"/>
+                </a:ext>
+              </a:extLst>
+            </p:cNvPr>
+            <p:cNvSpPr txBox="1"/>
+            <p:nvPr/>
+          </p:nvSpPr>
+          <p:spPr>
+            <a:xfrm>
+              <a:off x="3931310" y="101483"/>
+              <a:ext cx="980984" cy="369332"/>
+            </a:xfrm>
+            <a:prstGeom prst="rect">
+              <a:avLst/>
+            </a:prstGeom>
+            <a:noFill/>
+          </p:spPr>
+          <p:txBody>
+            <a:bodyPr wrap="square" rtlCol="0">
+              <a:spAutoFit/>
+            </a:bodyPr>
+            <a:lstStyle/>
+            <a:p>
+              <a:r>
+                <a:rPr lang="hu-HU" dirty="0">
+                  <a:solidFill>
+                    <a:schemeClr val="bg1"/>
+                  </a:solidFill>
+                </a:rPr>
+                <a:t>Active</a:t>
+              </a:r>
+            </a:p>
+          </p:txBody>
+        </p:sp>
+      </p:grpSp>
+      <p:sp>
+        <p:nvSpPr>
+          <p:cNvPr id="178" name="Téglalap: lekerekített 177">
+            <a:extLst>
+              <a:ext uri="{FF2B5EF4-FFF2-40B4-BE49-F238E27FC236}">
+                <a16:creationId xmlns:a16="http://schemas.microsoft.com/office/drawing/2014/main" id="{7A446DB5-8282-43B6-8B23-E42471AC8196}"/>
+              </a:ext>
+            </a:extLst>
+          </p:cNvPr>
+          <p:cNvSpPr/>
+          <p:nvPr/>
+        </p:nvSpPr>
+        <p:spPr>
+          <a:xfrm>
+            <a:off x="2326461" y="129251"/>
+            <a:ext cx="1347843" cy="623772"/>
+          </a:xfrm>
+          <a:prstGeom prst="roundRect">
+            <a:avLst/>
+          </a:prstGeom>
+        </p:spPr>
+        <p:style>
+          <a:lnRef idx="2">
+            <a:schemeClr val="accent2">
+              <a:shade val="50000"/>
+            </a:schemeClr>
+          </a:lnRef>
+          <a:fillRef idx="1">
+            <a:schemeClr val="accent2"/>
+          </a:fillRef>
+          <a:effectRef idx="0">
+            <a:schemeClr val="accent2"/>
+          </a:effectRef>
+          <a:fontRef idx="minor">
+            <a:schemeClr val="lt1"/>
+          </a:fontRef>
+        </p:style>
+        <p:txBody>
+          <a:bodyPr rtlCol="0" anchor="ctr"/>
+          <a:lstStyle/>
+          <a:p>
+            <a:pPr algn="ctr"/>
+            <a:r>
+              <a:rPr lang="hu-HU" dirty="0"/>
+              <a:t>Inactive</a:t>
+            </a:r>
+          </a:p>
+        </p:txBody>
+      </p:sp>
+      <p:sp>
+        <p:nvSpPr>
+          <p:cNvPr id="179" name="Tilos tábla 178">
+            <a:extLst>
+              <a:ext uri="{FF2B5EF4-FFF2-40B4-BE49-F238E27FC236}">
+                <a16:creationId xmlns:a16="http://schemas.microsoft.com/office/drawing/2014/main" id="{6146F34C-1F94-4D1D-8E1B-9ADC6C11C090}"/>
+              </a:ext>
+            </a:extLst>
+          </p:cNvPr>
+          <p:cNvSpPr/>
+          <p:nvPr/>
+        </p:nvSpPr>
+        <p:spPr>
+          <a:xfrm>
+            <a:off x="215950" y="5125331"/>
+            <a:ext cx="1347843" cy="1239962"/>
+          </a:xfrm>
+          <a:prstGeom prst="noSmoking">
+            <a:avLst/>
+          </a:prstGeom>
+          <a:solidFill>
+            <a:srgbClr val="FF0000"/>
+          </a:solidFill>
+          <a:ln>
+            <a:solidFill>
+              <a:srgbClr val="FF0000"/>
+            </a:solidFill>
+          </a:ln>
+        </p:spPr>
+        <p:style>
+          <a:lnRef idx="2">
+            <a:schemeClr val="accent1">
+              <a:shade val="50000"/>
+            </a:schemeClr>
+          </a:lnRef>
+          <a:fillRef idx="1">
+            <a:schemeClr val="accent1"/>
+          </a:fillRef>
+          <a:effectRef idx="0">
+            <a:schemeClr val="accent1"/>
+          </a:effectRef>
+          <a:fontRef idx="minor">
+            <a:schemeClr val="lt1"/>
+          </a:fontRef>
+        </p:style>
+        <p:txBody>
+          <a:bodyPr rtlCol="0" anchor="ctr"/>
+          <a:lstStyle/>
+          <a:p>
+            <a:pPr algn="ctr"/>
+            <a:endParaRPr lang="hu-HU" dirty="0">
+              <a:solidFill>
+                <a:schemeClr val="tx1"/>
+              </a:solidFill>
+            </a:endParaRPr>
+          </a:p>
+        </p:txBody>
+      </p:sp>
+    </p:spTree>
+    <p:extLst>
+      <p:ext uri="{BB962C8B-B14F-4D97-AF65-F5344CB8AC3E}">
+        <p14:creationId xmlns:p14="http://schemas.microsoft.com/office/powerpoint/2010/main" val="3438714426"/>
+      </p:ext>
+    </p:extLst>
+  </p:cSld>
+  <p:clrMapOvr>
+    <a:masterClrMapping/>
+  </p:clrMapOvr>
+</p:sld>
+</file>
+
 <file path=ppt/theme/theme1.xml><?xml version="1.0" encoding="utf-8"?>
 <a:theme xmlns:a="http://schemas.openxmlformats.org/drawingml/2006/main" name="Office-téma">
   <a:themeElements>

</xml_diff>